<commit_message>
Tweaks and corrections in the slide deck.
</commit_message>
<xml_diff>
--- a/DevConnect-TPL.pptx
+++ b/DevConnect-TPL.pptx
@@ -5,7 +5,7 @@
     <p:sldMasterId id="2147483648" r:id="rId4"/>
   </p:sldMasterIdLst>
   <p:notesMasterIdLst>
-    <p:notesMasterId r:id="rId21"/>
+    <p:notesMasterId r:id="rId22"/>
   </p:notesMasterIdLst>
   <p:sldIdLst>
     <p:sldId id="256" r:id="rId5"/>
@@ -22,8 +22,9 @@
     <p:sldId id="272" r:id="rId16"/>
     <p:sldId id="273" r:id="rId17"/>
     <p:sldId id="262" r:id="rId18"/>
-    <p:sldId id="274" r:id="rId19"/>
-    <p:sldId id="261" r:id="rId20"/>
+    <p:sldId id="275" r:id="rId19"/>
+    <p:sldId id="274" r:id="rId20"/>
+    <p:sldId id="261" r:id="rId21"/>
   </p:sldIdLst>
   <p:sldSz cx="12192000" cy="6858000"/>
   <p:notesSz cx="6858000" cy="9144000"/>
@@ -481,6 +482,125 @@
 </file>
 
 <file path=ppt/notesSlides/notesSlide1.xml><?xml version="1.0" encoding="utf-8"?>
+<p:notes xmlns:a="http://schemas.openxmlformats.org/drawingml/2006/main" xmlns:r="http://schemas.openxmlformats.org/officeDocument/2006/relationships" xmlns:p="http://schemas.openxmlformats.org/presentationml/2006/main" showMasterSp="0" showMasterPhAnim="0">
+  <p:cSld>
+    <p:spTree>
+      <p:nvGrpSpPr>
+        <p:cNvPr id="1" name="Shape 50"/>
+        <p:cNvGrpSpPr/>
+        <p:nvPr/>
+      </p:nvGrpSpPr>
+      <p:grpSpPr>
+        <a:xfrm>
+          <a:off x="0" y="0"/>
+          <a:ext cx="0" cy="0"/>
+          <a:chOff x="0" y="0"/>
+          <a:chExt cx="0" cy="0"/>
+        </a:xfrm>
+      </p:grpSpPr>
+      <p:sp>
+        <p:nvSpPr>
+          <p:cNvPr id="51" name="Shape 51"/>
+          <p:cNvSpPr>
+            <a:spLocks noGrp="1" noRot="1" noChangeAspect="1"/>
+          </p:cNvSpPr>
+          <p:nvPr>
+            <p:ph type="sldImg" idx="2"/>
+          </p:nvPr>
+        </p:nvSpPr>
+        <p:spPr>
+          <a:xfrm>
+            <a:off x="381000" y="685800"/>
+            <a:ext cx="6096000" cy="3429000"/>
+          </a:xfrm>
+          <a:custGeom>
+            <a:avLst/>
+            <a:gdLst/>
+            <a:ahLst/>
+            <a:cxnLst/>
+            <a:rect l="0" t="0" r="0" b="0"/>
+            <a:pathLst>
+              <a:path w="120000" h="120000" extrusionOk="0">
+                <a:moveTo>
+                  <a:pt x="0" y="0"/>
+                </a:moveTo>
+                <a:lnTo>
+                  <a:pt x="120000" y="0"/>
+                </a:lnTo>
+                <a:lnTo>
+                  <a:pt x="120000" y="120000"/>
+                </a:lnTo>
+                <a:lnTo>
+                  <a:pt x="0" y="120000"/>
+                </a:lnTo>
+                <a:close/>
+              </a:path>
+            </a:pathLst>
+          </a:custGeom>
+          <a:noFill/>
+          <a:ln w="9525" cap="flat">
+            <a:solidFill>
+              <a:srgbClr val="000000"/>
+            </a:solidFill>
+            <a:prstDash val="solid"/>
+            <a:round/>
+            <a:headEnd type="none" w="med" len="med"/>
+            <a:tailEnd type="none" w="med" len="med"/>
+          </a:ln>
+        </p:spPr>
+      </p:sp>
+      <p:sp>
+        <p:nvSpPr>
+          <p:cNvPr id="52" name="Shape 52"/>
+          <p:cNvSpPr txBox="1">
+            <a:spLocks noGrp="1"/>
+          </p:cNvSpPr>
+          <p:nvPr>
+            <p:ph type="body" idx="1"/>
+          </p:nvPr>
+        </p:nvSpPr>
+        <p:spPr>
+          <a:xfrm>
+            <a:off x="685800" y="4343400"/>
+            <a:ext cx="5486399" cy="4114800"/>
+          </a:xfrm>
+          <a:prstGeom prst="rect">
+            <a:avLst/>
+          </a:prstGeom>
+        </p:spPr>
+        <p:txBody>
+          <a:bodyPr lIns="91425" tIns="91425" rIns="91425" bIns="91425" anchor="t" anchorCtr="0">
+            <a:noAutofit/>
+          </a:bodyPr>
+          <a:lstStyle/>
+          <a:p>
+            <a:pPr>
+              <a:spcBef>
+                <a:spcPts val="0"/>
+              </a:spcBef>
+              <a:buNone/>
+            </a:pPr>
+            <a:r>
+              <a:rPr lang="en"/>
+              <a:t>I started developing software since high school, I then went onto to Conestoga College for the Software Engineering Technology course for 4 years, 16 months of which was spent at Magnet, and I’ve been working at Magnet since I graduated early last year.</a:t>
+            </a:r>
+          </a:p>
+        </p:txBody>
+      </p:sp>
+    </p:spTree>
+    <p:extLst>
+      <p:ext uri="{BB962C8B-B14F-4D97-AF65-F5344CB8AC3E}">
+        <p14:creationId xmlns:p14="http://schemas.microsoft.com/office/powerpoint/2010/main" val="2494334121"/>
+      </p:ext>
+    </p:extLst>
+  </p:cSld>
+  <p:clrMapOvr>
+    <a:masterClrMapping/>
+  </p:clrMapOvr>
+</p:notes>
+</file>
+
+<file path=ppt/notesSlides/notesSlide2.xml><?xml version="1.0" encoding="utf-8"?>
 <p:notes xmlns:a="http://schemas.openxmlformats.org/drawingml/2006/main" xmlns:r="http://schemas.openxmlformats.org/officeDocument/2006/relationships" xmlns:p="http://schemas.openxmlformats.org/presentationml/2006/main" showMasterSp="0" showMasterPhAnim="0">
   <p:cSld>
     <p:spTree>
@@ -4165,6 +4285,13 @@
   <p:clrMapOvr>
     <a:masterClrMapping/>
   </p:clrMapOvr>
+  <p:timing>
+    <p:tnLst>
+      <p:par>
+        <p:cTn id="1" dur="indefinite" restart="never" nodeType="tmRoot"/>
+      </p:par>
+    </p:tnLst>
+  </p:timing>
 </p:sld>
 </file>
 
@@ -5215,7 +5342,7 @@
         <p:spPr>
           <a:xfrm>
             <a:off x="838200" y="1480185"/>
-            <a:ext cx="10515600" cy="4351338"/>
+            <a:ext cx="10515600" cy="5216706"/>
           </a:xfrm>
         </p:spPr>
         <p:txBody>
@@ -5285,31 +5412,6 @@
             </a:endParaRPr>
           </a:p>
           <a:p>
-            <a:pPr lvl="1"/>
-            <a:r>
-              <a:rPr lang="en-CA" dirty="0" err="1" smtClean="0">
-                <a:solidFill>
-                  <a:schemeClr val="bg1"/>
-                </a:solidFill>
-              </a:rPr>
-              <a:t>AggregateException</a:t>
-            </a:r>
-            <a:r>
-              <a:rPr lang="en-CA" dirty="0" smtClean="0">
-                <a:solidFill>
-                  <a:schemeClr val="bg1"/>
-                </a:solidFill>
-              </a:rPr>
-              <a:t> collects all of the unhandled exceptions that happen in the task(s) that are running and returns them as a collection of </a:t>
-            </a:r>
-            <a:r>
-              <a:rPr lang="en-CA" dirty="0" err="1" smtClean="0">
-                <a:solidFill>
-                  <a:schemeClr val="bg1"/>
-                </a:solidFill>
-              </a:rPr>
-              <a:t>InnerExceptions</a:t>
-            </a:r>
             <a:endParaRPr lang="en-CA" dirty="0">
               <a:solidFill>
                 <a:schemeClr val="bg1"/>
@@ -5324,6 +5426,49 @@
             </a:endParaRPr>
           </a:p>
           <a:p>
+            <a:endParaRPr lang="en-CA" dirty="0">
+              <a:solidFill>
+                <a:schemeClr val="bg1"/>
+              </a:solidFill>
+            </a:endParaRPr>
+          </a:p>
+          <a:p>
+            <a:endParaRPr lang="en-CA" dirty="0" smtClean="0">
+              <a:solidFill>
+                <a:schemeClr val="bg1"/>
+              </a:solidFill>
+            </a:endParaRPr>
+          </a:p>
+          <a:p>
+            <a:endParaRPr lang="en-CA" dirty="0">
+              <a:solidFill>
+                <a:schemeClr val="bg1"/>
+              </a:solidFill>
+            </a:endParaRPr>
+          </a:p>
+          <a:p>
+            <a:endParaRPr lang="en-CA" dirty="0" smtClean="0">
+              <a:solidFill>
+                <a:schemeClr val="bg1"/>
+              </a:solidFill>
+            </a:endParaRPr>
+          </a:p>
+          <a:p>
+            <a:endParaRPr lang="en-CA" dirty="0" smtClean="0">
+              <a:solidFill>
+                <a:schemeClr val="bg1"/>
+              </a:solidFill>
+            </a:endParaRPr>
+          </a:p>
+          <a:p>
+            <a:r>
+              <a:rPr lang="en-CA" dirty="0" smtClean="0">
+                <a:solidFill>
+                  <a:schemeClr val="bg1"/>
+                </a:solidFill>
+              </a:rPr>
+              <a:t>You can also add a sub-task as an exception handler</a:t>
+            </a:r>
             <a:endParaRPr lang="en-CA" dirty="0">
               <a:solidFill>
                 <a:schemeClr val="bg1"/>
@@ -5371,7 +5516,7 @@
         </p:nvSpPr>
         <p:spPr bwMode="auto">
           <a:xfrm>
-            <a:off x="1680368" y="3416334"/>
+            <a:off x="1680368" y="2385258"/>
             <a:ext cx="8831264" cy="3323987"/>
           </a:xfrm>
           <a:prstGeom prst="rect">
@@ -6738,16 +6883,33 @@
                   <a:schemeClr val="bg1"/>
                 </a:solidFill>
               </a:rPr>
-              <a:t> to task body and check in your body for cancellation where it makes sense</a:t>
-            </a:r>
-          </a:p>
-          <a:p>
+              <a:t> to </a:t>
+            </a:r>
             <a:r>
               <a:rPr lang="en-CA" dirty="0" smtClean="0">
                 <a:solidFill>
                   <a:schemeClr val="bg1"/>
                 </a:solidFill>
               </a:rPr>
+              <a:t>the task </a:t>
+            </a:r>
+            <a:r>
+              <a:rPr lang="en-CA" dirty="0" smtClean="0">
+                <a:solidFill>
+                  <a:schemeClr val="bg1"/>
+                </a:solidFill>
+              </a:rPr>
+              <a:t>body and check in your body for cancellation where it makes sense</a:t>
+            </a:r>
+          </a:p>
+          <a:p>
+            <a:pPr lvl="1"/>
+            <a:r>
+              <a:rPr lang="en-CA" dirty="0" smtClean="0">
+                <a:solidFill>
+                  <a:schemeClr val="bg1"/>
+                </a:solidFill>
+              </a:rPr>
               <a:t>Best practice is to check for cancellation, do clean up and then fire </a:t>
             </a:r>
             <a:r>
@@ -6757,6 +6919,34 @@
                 </a:solidFill>
               </a:rPr>
               <a:t>TaskCanceledException</a:t>
+            </a:r>
+            <a:r>
+              <a:rPr lang="en-CA" dirty="0" smtClean="0">
+                <a:solidFill>
+                  <a:schemeClr val="bg1"/>
+                </a:solidFill>
+              </a:rPr>
+              <a:t> using </a:t>
+            </a:r>
+            <a:r>
+              <a:rPr lang="en-US" altLang="en-US" dirty="0" err="1" smtClean="0">
+                <a:solidFill>
+                  <a:schemeClr val="bg1"/>
+                </a:solidFill>
+                <a:latin typeface="Consolas" panose="020B0609020204030204" pitchFamily="49" charset="0"/>
+                <a:cs typeface="Consolas" panose="020B0609020204030204" pitchFamily="49" charset="0"/>
+              </a:rPr>
+              <a:t>ThrowIfCancellationRequested</a:t>
+            </a:r>
+            <a:r>
+              <a:rPr lang="en-US" altLang="en-US" dirty="0" smtClean="0">
+                <a:solidFill>
+                  <a:schemeClr val="bg1"/>
+                </a:solidFill>
+                <a:latin typeface="Consolas" panose="020B0609020204030204" pitchFamily="49" charset="0"/>
+                <a:cs typeface="Consolas" panose="020B0609020204030204" pitchFamily="49" charset="0"/>
+              </a:rPr>
+              <a:t>()</a:t>
             </a:r>
             <a:endParaRPr lang="en-CA" dirty="0" smtClean="0">
               <a:solidFill>
@@ -6779,6 +6969,14 @@
             </a:endParaRPr>
           </a:p>
           <a:p>
+            <a:endParaRPr lang="en-CA" dirty="0" smtClean="0">
+              <a:solidFill>
+                <a:schemeClr val="bg1"/>
+              </a:solidFill>
+            </a:endParaRPr>
+          </a:p>
+          <a:p>
+            <a:pPr lvl="1"/>
             <a:endParaRPr lang="en-CA" dirty="0" smtClean="0">
               <a:solidFill>
                 <a:schemeClr val="bg1"/>
@@ -6892,8 +7090,8 @@
         </p:nvSpPr>
         <p:spPr bwMode="auto">
           <a:xfrm>
-            <a:off x="1978526" y="3429000"/>
-            <a:ext cx="8234947" cy="1600438"/>
+            <a:off x="3668092" y="3088422"/>
+            <a:ext cx="4855816" cy="2246769"/>
           </a:xfrm>
           <a:prstGeom prst="rect">
             <a:avLst/>
@@ -7061,7 +7259,7 @@
                 <a:latin typeface="Consolas" panose="020B0609020204030204" pitchFamily="49" charset="0"/>
                 <a:cs typeface="Consolas" panose="020B0609020204030204" pitchFamily="49" charset="0"/>
               </a:rPr>
-              <a:t>                                        if</a:t>
+              <a:t>     if</a:t>
             </a:r>
             <a:r>
               <a:rPr lang="en-US" altLang="en-US" sz="1400" dirty="0">
@@ -7091,8 +7289,35 @@
                 <a:latin typeface="Consolas" panose="020B0609020204030204" pitchFamily="49" charset="0"/>
                 <a:cs typeface="Consolas" panose="020B0609020204030204" pitchFamily="49" charset="0"/>
               </a:rPr>
-              <a:t>) {</a:t>
-            </a:r>
+              <a:t>) </a:t>
+            </a:r>
+            <a:r>
+              <a:rPr lang="en-US" altLang="en-US" sz="1400" dirty="0" smtClean="0">
+                <a:solidFill>
+                  <a:srgbClr val="000000"/>
+                </a:solidFill>
+                <a:latin typeface="Consolas" panose="020B0609020204030204" pitchFamily="49" charset="0"/>
+                <a:cs typeface="Consolas" panose="020B0609020204030204" pitchFamily="49" charset="0"/>
+              </a:rPr>
+              <a:t>{</a:t>
+            </a:r>
+          </a:p>
+          <a:p>
+            <a:pPr lvl="0" eaLnBrk="0" fontAlgn="base" hangingPunct="0">
+              <a:spcBef>
+                <a:spcPct val="0"/>
+              </a:spcBef>
+              <a:spcAft>
+                <a:spcPct val="0"/>
+              </a:spcAft>
+            </a:pPr>
+            <a:endParaRPr lang="en-US" altLang="en-US" sz="1400" dirty="0" smtClean="0">
+              <a:solidFill>
+                <a:srgbClr val="000000"/>
+              </a:solidFill>
+              <a:latin typeface="Consolas" panose="020B0609020204030204" pitchFamily="49" charset="0"/>
+              <a:cs typeface="Consolas" panose="020B0609020204030204" pitchFamily="49" charset="0"/>
+            </a:endParaRPr>
           </a:p>
           <a:p>
             <a:pPr eaLnBrk="0" fontAlgn="base" hangingPunct="0">
@@ -7129,7 +7354,17 @@
                 <a:latin typeface="Consolas" panose="020B0609020204030204" pitchFamily="49" charset="0"/>
                 <a:cs typeface="Consolas" panose="020B0609020204030204" pitchFamily="49" charset="0"/>
               </a:rPr>
-              <a:t>                                           </a:t>
+              <a:t>        </a:t>
+            </a:r>
+            <a:r>
+              <a:rPr lang="en-US" altLang="en-US" sz="1400" dirty="0" smtClean="0">
+                <a:solidFill>
+                  <a:srgbClr val="008000"/>
+                </a:solidFill>
+                <a:latin typeface="Consolas" panose="020B0609020204030204" pitchFamily="49" charset="0"/>
+                <a:cs typeface="Consolas" panose="020B0609020204030204" pitchFamily="49" charset="0"/>
+              </a:rPr>
+              <a:t>//</a:t>
             </a:r>
             <a:r>
               <a:rPr lang="en-US" altLang="en-US" sz="1400" dirty="0">
@@ -7139,7 +7374,7 @@
                 <a:latin typeface="Consolas" panose="020B0609020204030204" pitchFamily="49" charset="0"/>
                 <a:cs typeface="Consolas" panose="020B0609020204030204" pitchFamily="49" charset="0"/>
               </a:rPr>
-              <a:t>// Do </a:t>
+              <a:t> Do </a:t>
             </a:r>
             <a:r>
               <a:rPr lang="en-US" altLang="en-US" sz="1400" dirty="0" smtClean="0">
@@ -7171,6 +7406,16 @@
               </a:rPr>
               <a:t>.</a:t>
             </a:r>
+          </a:p>
+          <a:p>
+            <a:pPr eaLnBrk="0" fontAlgn="base" hangingPunct="0">
+              <a:spcBef>
+                <a:spcPct val="0"/>
+              </a:spcBef>
+              <a:spcAft>
+                <a:spcPct val="0"/>
+              </a:spcAft>
+            </a:pPr>
             <a:endParaRPr kumimoji="0" lang="en-US" altLang="en-US" sz="1400" b="0" i="0" u="none" strike="noStrike" cap="none" normalizeH="0" baseline="0" dirty="0" smtClean="0">
               <a:ln>
                 <a:noFill/>
@@ -7200,7 +7445,7 @@
                 <a:latin typeface="Consolas" panose="020B0609020204030204" pitchFamily="49" charset="0"/>
                 <a:cs typeface="Consolas" panose="020B0609020204030204" pitchFamily="49" charset="0"/>
               </a:rPr>
-              <a:t>                                            </a:t>
+              <a:t>         </a:t>
             </a:r>
             <a:r>
               <a:rPr lang="en-US" altLang="en-US" sz="1400" dirty="0" err="1" smtClean="0">
@@ -7258,8 +7503,43 @@
                 <a:latin typeface="Consolas" panose="020B0609020204030204" pitchFamily="49" charset="0"/>
                 <a:cs typeface="Consolas" panose="020B0609020204030204" pitchFamily="49" charset="0"/>
               </a:rPr>
-              <a:t>                                       }</a:t>
-            </a:r>
+              <a:t>    </a:t>
+            </a:r>
+            <a:r>
+              <a:rPr kumimoji="0" lang="en-US" altLang="en-US" sz="1400" b="0" i="0" u="none" strike="noStrike" cap="none" normalizeH="0" baseline="0" dirty="0" smtClean="0">
+                <a:ln>
+                  <a:noFill/>
+                </a:ln>
+                <a:solidFill>
+                  <a:srgbClr val="000000"/>
+                </a:solidFill>
+                <a:effectLst/>
+                <a:latin typeface="Consolas" panose="020B0609020204030204" pitchFamily="49" charset="0"/>
+                <a:cs typeface="Consolas" panose="020B0609020204030204" pitchFamily="49" charset="0"/>
+              </a:rPr>
+              <a:t>}</a:t>
+            </a:r>
+          </a:p>
+          <a:p>
+            <a:pPr lvl="0" eaLnBrk="0" fontAlgn="base" hangingPunct="0">
+              <a:spcBef>
+                <a:spcPct val="0"/>
+              </a:spcBef>
+              <a:spcAft>
+                <a:spcPct val="0"/>
+              </a:spcAft>
+            </a:pPr>
+            <a:endParaRPr kumimoji="0" lang="en-US" altLang="en-US" sz="1400" b="0" i="0" u="none" strike="noStrike" cap="none" normalizeH="0" baseline="0" dirty="0" smtClean="0">
+              <a:ln>
+                <a:noFill/>
+              </a:ln>
+              <a:solidFill>
+                <a:srgbClr val="000000"/>
+              </a:solidFill>
+              <a:effectLst/>
+              <a:latin typeface="Consolas" panose="020B0609020204030204" pitchFamily="49" charset="0"/>
+              <a:cs typeface="Consolas" panose="020B0609020204030204" pitchFamily="49" charset="0"/>
+            </a:endParaRPr>
           </a:p>
           <a:p>
             <a:pPr marL="0" marR="0" lvl="0" indent="0" algn="l" defTabSz="914400" rtl="0" eaLnBrk="0" fontAlgn="base" latinLnBrk="0" hangingPunct="0">
@@ -7290,7 +7570,7 @@
                 <a:latin typeface="Consolas" panose="020B0609020204030204" pitchFamily="49" charset="0"/>
                 <a:cs typeface="Consolas" panose="020B0609020204030204" pitchFamily="49" charset="0"/>
               </a:rPr>
-              <a:t>                                        </a:t>
+              <a:t>     </a:t>
             </a:r>
             <a:r>
               <a:rPr kumimoji="0" lang="en-US" altLang="en-US" sz="1400" b="0" i="0" u="none" strike="noStrike" cap="none" normalizeH="0" baseline="0" dirty="0" smtClean="0">
@@ -7304,7 +7584,21 @@
                 <a:latin typeface="Consolas" panose="020B0609020204030204" pitchFamily="49" charset="0"/>
                 <a:cs typeface="Consolas" panose="020B0609020204030204" pitchFamily="49" charset="0"/>
               </a:rPr>
-              <a:t>// Do work here.</a:t>
+              <a:t>//</a:t>
+            </a:r>
+            <a:r>
+              <a:rPr kumimoji="0" lang="en-US" altLang="en-US" sz="1400" b="0" i="0" u="none" strike="noStrike" cap="none" normalizeH="0" baseline="0" dirty="0" smtClean="0">
+                <a:ln>
+                  <a:noFill/>
+                </a:ln>
+                <a:solidFill>
+                  <a:srgbClr val="008000"/>
+                </a:solidFill>
+                <a:effectLst/>
+                <a:latin typeface="Consolas" panose="020B0609020204030204" pitchFamily="49" charset="0"/>
+                <a:cs typeface="Consolas" panose="020B0609020204030204" pitchFamily="49" charset="0"/>
+              </a:rPr>
+              <a:t> Do work here.</a:t>
             </a:r>
           </a:p>
           <a:p>
@@ -7336,7 +7630,35 @@
                 <a:latin typeface="Consolas" panose="020B0609020204030204" pitchFamily="49" charset="0"/>
                 <a:cs typeface="Consolas" panose="020B0609020204030204" pitchFamily="49" charset="0"/>
               </a:rPr>
-              <a:t>                                    }, token); </a:t>
+              <a:t> </a:t>
+            </a:r>
+            <a:r>
+              <a:rPr kumimoji="0" lang="en-US" altLang="en-US" sz="1400" b="0" i="0" u="none" strike="noStrike" cap="none" normalizeH="0" baseline="0" dirty="0" smtClean="0">
+                <a:ln>
+                  <a:noFill/>
+                </a:ln>
+                <a:solidFill>
+                  <a:srgbClr val="000000"/>
+                </a:solidFill>
+                <a:effectLst/>
+                <a:latin typeface="Consolas" panose="020B0609020204030204" pitchFamily="49" charset="0"/>
+                <a:cs typeface="Consolas" panose="020B0609020204030204" pitchFamily="49" charset="0"/>
+              </a:rPr>
+              <a:t>},</a:t>
+            </a:r>
+            <a:r>
+              <a:rPr kumimoji="0" lang="en-US" altLang="en-US" sz="1400" b="0" i="0" u="none" strike="noStrike" cap="none" normalizeH="0" baseline="0" dirty="0" smtClean="0">
+                <a:ln>
+                  <a:noFill/>
+                </a:ln>
+                <a:solidFill>
+                  <a:srgbClr val="000000"/>
+                </a:solidFill>
+                <a:effectLst/>
+                <a:latin typeface="Consolas" panose="020B0609020204030204" pitchFamily="49" charset="0"/>
+                <a:cs typeface="Consolas" panose="020B0609020204030204" pitchFamily="49" charset="0"/>
+              </a:rPr>
+              <a:t> token); </a:t>
             </a:r>
             <a:endParaRPr kumimoji="0" lang="en-US" altLang="en-US" sz="1400" b="0" i="0" u="none" strike="noStrike" cap="none" normalizeH="0" baseline="0" dirty="0" smtClean="0">
               <a:ln>
@@ -7361,6 +7683,13 @@
   <p:clrMapOvr>
     <a:masterClrMapping/>
   </p:clrMapOvr>
+  <p:timing>
+    <p:tnLst>
+      <p:par>
+        <p:cTn id="1" dur="indefinite" restart="never" nodeType="tmRoot"/>
+      </p:par>
+    </p:tnLst>
+  </p:timing>
 </p:sld>
 </file>
 
@@ -8222,6 +8551,13 @@
   <p:clrMapOvr>
     <a:masterClrMapping/>
   </p:clrMapOvr>
+  <p:timing>
+    <p:tnLst>
+      <p:par>
+        <p:cTn id="1" dur="indefinite" restart="never" nodeType="tmRoot"/>
+      </p:par>
+    </p:tnLst>
+  </p:timing>
 </p:sld>
 </file>
 
@@ -8327,7 +8663,23 @@
                   <a:schemeClr val="accent1"/>
                 </a:solidFill>
               </a:rPr>
-              <a:t>References</a:t>
+              <a:t>Task Parallel Library </a:t>
+            </a:r>
+            <a:r>
+              <a:rPr lang="en-CA" b="1" dirty="0" smtClean="0">
+                <a:solidFill>
+                  <a:schemeClr val="bg1"/>
+                </a:solidFill>
+              </a:rPr>
+              <a:t>/</a:t>
+            </a:r>
+            <a:r>
+              <a:rPr lang="en-CA" dirty="0" smtClean="0">
+                <a:solidFill>
+                  <a:schemeClr val="accent1"/>
+                </a:solidFill>
+              </a:rPr>
+              <a:t> References</a:t>
             </a:r>
             <a:endParaRPr lang="en-CA" dirty="0">
               <a:solidFill>
@@ -8349,8 +8701,8 @@
         </p:nvSpPr>
         <p:spPr>
           <a:xfrm>
-            <a:off x="838200" y="1524000"/>
-            <a:ext cx="10515600" cy="4652963"/>
+            <a:off x="3471454" y="1454332"/>
+            <a:ext cx="5249091" cy="4652963"/>
           </a:xfrm>
         </p:spPr>
         <p:txBody>
@@ -8439,6 +8791,9 @@
             </a:endParaRPr>
           </a:p>
           <a:p>
+            <a:pPr marL="0" indent="0">
+              <a:buNone/>
+            </a:pPr>
             <a:r>
               <a:rPr lang="en-CA" sz="2000" dirty="0" smtClean="0">
                 <a:solidFill>
@@ -8496,6 +8851,27 @@
                 <a:hlinkClick r:id="rId8"/>
               </a:rPr>
               <a:t>ConcurrentDictionary</a:t>
+            </a:r>
+            <a:endParaRPr lang="en-CA" dirty="0" smtClean="0">
+              <a:solidFill>
+                <a:schemeClr val="bg1"/>
+              </a:solidFill>
+            </a:endParaRPr>
+          </a:p>
+          <a:p>
+            <a:pPr marL="228600" lvl="2">
+              <a:spcBef>
+                <a:spcPts val="1000"/>
+              </a:spcBef>
+            </a:pPr>
+            <a:r>
+              <a:rPr lang="en-CA" dirty="0" smtClean="0">
+                <a:solidFill>
+                  <a:schemeClr val="bg1"/>
+                </a:solidFill>
+                <a:hlinkClick r:id="rId9"/>
+              </a:rPr>
+              <a:t>Using Lazy Instead of Double-Check Locking</a:t>
             </a:r>
             <a:endParaRPr lang="en-CA" dirty="0">
               <a:solidFill>
@@ -8522,10 +8898,409 @@
   <p:clrMapOvr>
     <a:masterClrMapping/>
   </p:clrMapOvr>
+  <p:timing>
+    <p:tnLst>
+      <p:par>
+        <p:cTn id="1" dur="indefinite" restart="never" nodeType="tmRoot"/>
+      </p:par>
+    </p:tnLst>
+  </p:timing>
 </p:sld>
 </file>
 
 <file path=ppt/slides/slide15.xml><?xml version="1.0" encoding="utf-8"?>
+<p:sld xmlns:a="http://schemas.openxmlformats.org/drawingml/2006/main" xmlns:r="http://schemas.openxmlformats.org/officeDocument/2006/relationships" xmlns:p="http://schemas.openxmlformats.org/presentationml/2006/main">
+  <p:cSld>
+    <p:spTree>
+      <p:nvGrpSpPr>
+        <p:cNvPr id="1" name="Shape 47"/>
+        <p:cNvGrpSpPr/>
+        <p:nvPr/>
+      </p:nvGrpSpPr>
+      <p:grpSpPr>
+        <a:xfrm>
+          <a:off x="0" y="0"/>
+          <a:ext cx="0" cy="0"/>
+          <a:chOff x="0" y="0"/>
+          <a:chExt cx="0" cy="0"/>
+        </a:xfrm>
+      </p:grpSpPr>
+      <p:pic>
+        <p:nvPicPr>
+          <p:cNvPr id="4" name="Picture 3" descr="Magnet Forensics background_1200px_1.jpg"/>
+          <p:cNvPicPr>
+            <a:picLocks noChangeAspect="1"/>
+          </p:cNvPicPr>
+          <p:nvPr/>
+        </p:nvPicPr>
+        <p:blipFill>
+          <a:blip r:embed="rId3">
+            <a:extLst>
+              <a:ext uri="{28A0092B-C50C-407E-A947-70E740481C1C}">
+                <a14:useLocalDpi xmlns:a14="http://schemas.microsoft.com/office/drawing/2010/main" val="0"/>
+              </a:ext>
+            </a:extLst>
+          </a:blip>
+          <a:stretch>
+            <a:fillRect/>
+          </a:stretch>
+        </p:blipFill>
+        <p:spPr>
+          <a:xfrm>
+            <a:off x="0" y="0"/>
+            <a:ext cx="12192000" cy="6858000"/>
+          </a:xfrm>
+          <a:prstGeom prst="rect">
+            <a:avLst/>
+          </a:prstGeom>
+        </p:spPr>
+      </p:pic>
+      <p:grpSp>
+        <p:nvGrpSpPr>
+          <p:cNvPr id="2" name="Group 1"/>
+          <p:cNvGrpSpPr/>
+          <p:nvPr/>
+        </p:nvGrpSpPr>
+        <p:grpSpPr>
+          <a:xfrm>
+            <a:off x="905328" y="2143964"/>
+            <a:ext cx="10448472" cy="1643527"/>
+            <a:chOff x="1197664" y="1507195"/>
+            <a:chExt cx="10448472" cy="1643527"/>
+          </a:xfrm>
+        </p:grpSpPr>
+        <p:sp>
+          <p:nvSpPr>
+            <p:cNvPr id="5" name="TextBox 4"/>
+            <p:cNvSpPr txBox="1"/>
+            <p:nvPr/>
+          </p:nvSpPr>
+          <p:spPr>
+            <a:xfrm>
+              <a:off x="1912342" y="1507195"/>
+              <a:ext cx="9733794" cy="1643527"/>
+            </a:xfrm>
+            <a:prstGeom prst="rect">
+              <a:avLst/>
+            </a:prstGeom>
+            <a:noFill/>
+          </p:spPr>
+          <p:txBody>
+            <a:bodyPr wrap="square" rtlCol="0">
+              <a:spAutoFit/>
+            </a:bodyPr>
+            <a:lstStyle/>
+            <a:p>
+              <a:pPr>
+                <a:lnSpc>
+                  <a:spcPct val="120000"/>
+                </a:lnSpc>
+              </a:pPr>
+              <a:r>
+                <a:rPr lang="en-US" sz="2800" dirty="0" smtClean="0">
+                  <a:solidFill>
+                    <a:srgbClr val="FFFFFF"/>
+                  </a:solidFill>
+                </a:rPr>
+                <a:t>: </a:t>
+              </a:r>
+              <a:r>
+                <a:rPr lang="en-US" sz="2800" dirty="0" smtClean="0">
+                  <a:solidFill>
+                    <a:srgbClr val="FFFFFF"/>
+                  </a:solidFill>
+                  <a:hlinkClick r:id="rId4"/>
+                </a:rPr>
+                <a:t>https://github.com/CSharpDevConnect/CSharpDevConnect.TPL</a:t>
+              </a:r>
+              <a:endParaRPr lang="en-US" sz="2800" dirty="0">
+                <a:solidFill>
+                  <a:srgbClr val="FFFFFF"/>
+                </a:solidFill>
+              </a:endParaRPr>
+            </a:p>
+          </p:txBody>
+        </p:sp>
+        <p:pic>
+          <p:nvPicPr>
+            <p:cNvPr id="7" name="Picture 6"/>
+            <p:cNvPicPr>
+              <a:picLocks noChangeAspect="1"/>
+            </p:cNvPicPr>
+            <p:nvPr/>
+          </p:nvPicPr>
+          <p:blipFill>
+            <a:blip r:embed="rId5">
+              <a:extLst>
+                <a:ext uri="{28A0092B-C50C-407E-A947-70E740481C1C}">
+                  <a14:useLocalDpi xmlns:a14="http://schemas.microsoft.com/office/drawing/2010/main" val="0"/>
+                </a:ext>
+              </a:extLst>
+            </a:blip>
+            <a:stretch>
+              <a:fillRect/>
+            </a:stretch>
+          </p:blipFill>
+          <p:spPr>
+            <a:xfrm>
+              <a:off x="1197664" y="1601641"/>
+              <a:ext cx="714678" cy="463818"/>
+            </a:xfrm>
+            <a:prstGeom prst="rect">
+              <a:avLst/>
+            </a:prstGeom>
+          </p:spPr>
+        </p:pic>
+      </p:grpSp>
+      <p:sp>
+        <p:nvSpPr>
+          <p:cNvPr id="12" name="TextBox 11"/>
+          <p:cNvSpPr txBox="1"/>
+          <p:nvPr/>
+        </p:nvSpPr>
+        <p:spPr>
+          <a:xfrm>
+            <a:off x="533400" y="1690565"/>
+            <a:ext cx="10972800" cy="461665"/>
+          </a:xfrm>
+          <a:prstGeom prst="rect">
+            <a:avLst/>
+          </a:prstGeom>
+          <a:noFill/>
+        </p:spPr>
+        <p:txBody>
+          <a:bodyPr wrap="square" rtlCol="0">
+            <a:spAutoFit/>
+          </a:bodyPr>
+          <a:lstStyle/>
+          <a:p>
+            <a:pPr marL="457200" indent="-457200">
+              <a:buFont typeface="Arial" panose="020B0604020202020204" pitchFamily="34" charset="0"/>
+              <a:buChar char="•"/>
+            </a:pPr>
+            <a:r>
+              <a:rPr lang="en-CA" sz="2400" dirty="0" smtClean="0">
+                <a:solidFill>
+                  <a:schemeClr val="bg1"/>
+                </a:solidFill>
+              </a:rPr>
+              <a:t>Slides, exercises and sample code can all be found on GitHub</a:t>
+            </a:r>
+            <a:endParaRPr lang="en-CA" sz="2400" dirty="0">
+              <a:solidFill>
+                <a:schemeClr val="bg1"/>
+              </a:solidFill>
+            </a:endParaRPr>
+          </a:p>
+        </p:txBody>
+      </p:sp>
+      <p:sp>
+        <p:nvSpPr>
+          <p:cNvPr id="15" name="Title 1"/>
+          <p:cNvSpPr>
+            <a:spLocks noGrp="1"/>
+          </p:cNvSpPr>
+          <p:nvPr>
+            <p:ph type="title"/>
+          </p:nvPr>
+        </p:nvSpPr>
+        <p:spPr>
+          <a:xfrm>
+            <a:off x="838200" y="365125"/>
+            <a:ext cx="10515600" cy="1325563"/>
+          </a:xfrm>
+        </p:spPr>
+        <p:txBody>
+          <a:bodyPr/>
+          <a:lstStyle/>
+          <a:p>
+            <a:r>
+              <a:rPr lang="en-CA" dirty="0" smtClean="0">
+                <a:solidFill>
+                  <a:schemeClr val="accent1"/>
+                </a:solidFill>
+              </a:rPr>
+              <a:t>Task Parallel Library </a:t>
+            </a:r>
+            <a:r>
+              <a:rPr lang="en-CA" b="1" dirty="0" smtClean="0">
+                <a:solidFill>
+                  <a:schemeClr val="bg1"/>
+                </a:solidFill>
+              </a:rPr>
+              <a:t>/</a:t>
+            </a:r>
+            <a:r>
+              <a:rPr lang="en-CA" dirty="0" smtClean="0">
+                <a:solidFill>
+                  <a:schemeClr val="accent1"/>
+                </a:solidFill>
+              </a:rPr>
+              <a:t> </a:t>
+            </a:r>
+            <a:r>
+              <a:rPr lang="en-CA" dirty="0" smtClean="0">
+                <a:solidFill>
+                  <a:schemeClr val="accent1"/>
+                </a:solidFill>
+              </a:rPr>
+              <a:t>Code &amp; Slides</a:t>
+            </a:r>
+            <a:endParaRPr lang="en-CA" dirty="0">
+              <a:solidFill>
+                <a:schemeClr val="accent1"/>
+              </a:solidFill>
+            </a:endParaRPr>
+          </a:p>
+        </p:txBody>
+      </p:sp>
+      <p:sp>
+        <p:nvSpPr>
+          <p:cNvPr id="18" name="TextBox 17"/>
+          <p:cNvSpPr txBox="1"/>
+          <p:nvPr/>
+        </p:nvSpPr>
+        <p:spPr>
+          <a:xfrm>
+            <a:off x="533400" y="2939281"/>
+            <a:ext cx="10972800" cy="830997"/>
+          </a:xfrm>
+          <a:prstGeom prst="rect">
+            <a:avLst/>
+          </a:prstGeom>
+          <a:noFill/>
+        </p:spPr>
+        <p:txBody>
+          <a:bodyPr wrap="square" rtlCol="0">
+            <a:spAutoFit/>
+          </a:bodyPr>
+          <a:lstStyle/>
+          <a:p>
+            <a:pPr marL="457200" indent="-457200">
+              <a:buFont typeface="Arial" panose="020B0604020202020204" pitchFamily="34" charset="0"/>
+              <a:buChar char="•"/>
+            </a:pPr>
+            <a:r>
+              <a:rPr lang="en-CA" sz="2400" dirty="0" smtClean="0">
+                <a:solidFill>
+                  <a:schemeClr val="bg1"/>
+                </a:solidFill>
+              </a:rPr>
+              <a:t>The code is split into two projects: one for exercises and one for the code samples from the presentation</a:t>
+            </a:r>
+            <a:endParaRPr lang="en-CA" sz="2400" dirty="0">
+              <a:solidFill>
+                <a:schemeClr val="bg1"/>
+              </a:solidFill>
+            </a:endParaRPr>
+          </a:p>
+        </p:txBody>
+      </p:sp>
+      <p:pic>
+        <p:nvPicPr>
+          <p:cNvPr id="13" name="Picture 12"/>
+          <p:cNvPicPr>
+            <a:picLocks noChangeAspect="1"/>
+          </p:cNvPicPr>
+          <p:nvPr/>
+        </p:nvPicPr>
+        <p:blipFill>
+          <a:blip r:embed="rId6"/>
+          <a:stretch>
+            <a:fillRect/>
+          </a:stretch>
+        </p:blipFill>
+        <p:spPr>
+          <a:xfrm>
+            <a:off x="3581400" y="3904350"/>
+            <a:ext cx="5029200" cy="1857375"/>
+          </a:xfrm>
+          <a:prstGeom prst="rect">
+            <a:avLst/>
+          </a:prstGeom>
+        </p:spPr>
+      </p:pic>
+      <p:sp>
+        <p:nvSpPr>
+          <p:cNvPr id="17" name="Rectangle 16"/>
+          <p:cNvSpPr/>
+          <p:nvPr/>
+        </p:nvSpPr>
+        <p:spPr>
+          <a:xfrm>
+            <a:off x="533400" y="5893985"/>
+            <a:ext cx="10820400" cy="830997"/>
+          </a:xfrm>
+          <a:prstGeom prst="rect">
+            <a:avLst/>
+          </a:prstGeom>
+        </p:spPr>
+        <p:txBody>
+          <a:bodyPr wrap="square">
+            <a:spAutoFit/>
+          </a:bodyPr>
+          <a:lstStyle/>
+          <a:p>
+            <a:pPr marL="457200" indent="-457200">
+              <a:buFont typeface="Arial" panose="020B0604020202020204" pitchFamily="34" charset="0"/>
+              <a:buChar char="•"/>
+            </a:pPr>
+            <a:r>
+              <a:rPr lang="en-CA" sz="2400" dirty="0" smtClean="0">
+                <a:solidFill>
+                  <a:schemeClr val="bg1"/>
+                </a:solidFill>
+              </a:rPr>
+              <a:t>There are three exercises.  Two around using </a:t>
+            </a:r>
+            <a:r>
+              <a:rPr lang="en-CA" sz="2400" dirty="0" err="1" smtClean="0">
+                <a:solidFill>
+                  <a:schemeClr val="bg1"/>
+                </a:solidFill>
+              </a:rPr>
+              <a:t>Parallel.ForEach</a:t>
+            </a:r>
+            <a:r>
+              <a:rPr lang="en-CA" sz="2400" dirty="0" smtClean="0">
+                <a:solidFill>
+                  <a:schemeClr val="bg1"/>
+                </a:solidFill>
+              </a:rPr>
+              <a:t>() and one that involves Tasks and task continuation.</a:t>
+            </a:r>
+            <a:endParaRPr lang="en-CA" sz="2400" dirty="0">
+              <a:solidFill>
+                <a:schemeClr val="bg1"/>
+              </a:solidFill>
+            </a:endParaRPr>
+          </a:p>
+        </p:txBody>
+      </p:sp>
+    </p:spTree>
+    <p:extLst>
+      <p:ext uri="{BB962C8B-B14F-4D97-AF65-F5344CB8AC3E}">
+        <p14:creationId xmlns:p14="http://schemas.microsoft.com/office/powerpoint/2010/main" val="4147129324"/>
+      </p:ext>
+    </p:extLst>
+  </p:cSld>
+  <p:clrMapOvr>
+    <a:masterClrMapping/>
+  </p:clrMapOvr>
+  <p:transition spd="slow">
+    <p:cut/>
+  </p:transition>
+  <p:timing>
+    <p:tnLst>
+      <p:par>
+        <p:cTn id="1" dur="indefinite" restart="never" nodeType="tmRoot"/>
+      </p:par>
+    </p:tnLst>
+  </p:timing>
+</p:sld>
+</file>
+
+<file path=ppt/slides/slide16.xml><?xml version="1.0" encoding="utf-8"?>
 <p:sld xmlns:a="http://schemas.openxmlformats.org/drawingml/2006/main" xmlns:r="http://schemas.openxmlformats.org/officeDocument/2006/relationships" xmlns:p="http://schemas.openxmlformats.org/presentationml/2006/main">
   <p:cSld>
     <p:spTree>
@@ -8663,10 +9438,17 @@
   <p:clrMapOvr>
     <a:masterClrMapping/>
   </p:clrMapOvr>
+  <p:timing>
+    <p:tnLst>
+      <p:par>
+        <p:cTn id="1" dur="indefinite" restart="never" nodeType="tmRoot"/>
+      </p:par>
+    </p:tnLst>
+  </p:timing>
 </p:sld>
 </file>
 
-<file path=ppt/slides/slide16.xml><?xml version="1.0" encoding="utf-8"?>
+<file path=ppt/slides/slide17.xml><?xml version="1.0" encoding="utf-8"?>
 <p:sld xmlns:a="http://schemas.openxmlformats.org/drawingml/2006/main" xmlns:r="http://schemas.openxmlformats.org/officeDocument/2006/relationships" xmlns:p="http://schemas.openxmlformats.org/presentationml/2006/main">
   <p:cSld>
     <p:bg>
@@ -9595,51 +10377,41 @@
                   <a:schemeClr val="bg1"/>
                 </a:solidFill>
               </a:rPr>
-              <a:t>The Task Parallel Library (TPL) is a set of public types and APIs in the</a:t>
-            </a:r>
-            <a:r>
-              <a:rPr lang="en-CA" i="1" dirty="0"/>
-              <a:t> </a:t>
+              <a:t>The Task Parallel Library (TPL) is a set of public types and APIs in the </a:t>
             </a:r>
             <a:r>
               <a:rPr lang="en-CA" i="1" dirty="0" err="1">
+                <a:solidFill>
+                  <a:schemeClr val="bg1"/>
+                </a:solidFill>
                 <a:hlinkClick r:id="rId3"/>
               </a:rPr>
               <a:t>System.Threading</a:t>
             </a:r>
             <a:r>
-              <a:rPr lang="en-CA" i="1" dirty="0"/>
-              <a:t> </a:t>
-            </a:r>
-            <a:r>
               <a:rPr lang="en-CA" i="1" dirty="0">
                 <a:solidFill>
                   <a:schemeClr val="bg1"/>
                 </a:solidFill>
               </a:rPr>
-              <a:t>and</a:t>
-            </a:r>
-            <a:r>
-              <a:rPr lang="en-CA" i="1" dirty="0"/>
-              <a:t> </a:t>
+              <a:t> and </a:t>
             </a:r>
             <a:r>
               <a:rPr lang="en-CA" i="1" dirty="0" err="1">
+                <a:solidFill>
+                  <a:schemeClr val="bg1"/>
+                </a:solidFill>
                 <a:hlinkClick r:id="rId4"/>
               </a:rPr>
               <a:t>System.Threading.Tasks</a:t>
             </a:r>
             <a:r>
-              <a:rPr lang="en-CA" i="1" dirty="0"/>
-              <a:t> namespaces. The purpose </a:t>
-            </a:r>
-            <a:r>
               <a:rPr lang="en-CA" i="1" dirty="0">
                 <a:solidFill>
                   <a:schemeClr val="bg1"/>
                 </a:solidFill>
               </a:rPr>
-              <a:t>of the TPL is to make developers more productive by simplifying the process of </a:t>
+              <a:t> namespaces. The purpose of the TPL is to make developers more productive by simplifying the process of </a:t>
             </a:r>
             <a:r>
               <a:rPr lang="en-CA" i="1" dirty="0" smtClean="0">
@@ -9693,6 +10465,13 @@
   <p:clrMapOvr>
     <a:masterClrMapping/>
   </p:clrMapOvr>
+  <p:timing>
+    <p:tnLst>
+      <p:par>
+        <p:cTn id="1" dur="indefinite" restart="never" nodeType="tmRoot"/>
+      </p:par>
+    </p:tnLst>
+  </p:timing>
 </p:sld>
 </file>
 
@@ -9907,6 +10686,13 @@
   <p:clrMapOvr>
     <a:masterClrMapping/>
   </p:clrMapOvr>
+  <p:timing>
+    <p:tnLst>
+      <p:par>
+        <p:cTn id="1" dur="indefinite" restart="never" nodeType="tmRoot"/>
+      </p:par>
+    </p:tnLst>
+  </p:timing>
 </p:sld>
 </file>
 
@@ -10046,7 +10832,9 @@
         </p:nvSpPr>
         <p:spPr/>
         <p:txBody>
-          <a:bodyPr/>
+          <a:bodyPr>
+            <a:normAutofit lnSpcReduction="10000"/>
+          </a:bodyPr>
           <a:lstStyle/>
           <a:p>
             <a:r>
@@ -10139,7 +10927,29 @@
               </a:rPr>
               <a:t>ParallelLoopResult</a:t>
             </a:r>
-            <a:endParaRPr lang="en-CA" sz="1600" dirty="0">
+            <a:endParaRPr lang="en-CA" sz="1600" dirty="0" smtClean="0">
+              <a:solidFill>
+                <a:schemeClr val="bg1"/>
+              </a:solidFill>
+            </a:endParaRPr>
+          </a:p>
+          <a:p>
+            <a:endParaRPr lang="en-CA" sz="2000" dirty="0">
+              <a:solidFill>
+                <a:schemeClr val="bg1"/>
+              </a:solidFill>
+            </a:endParaRPr>
+          </a:p>
+          <a:p>
+            <a:r>
+              <a:rPr lang="en-CA" dirty="0" err="1" smtClean="0">
+                <a:solidFill>
+                  <a:schemeClr val="bg1"/>
+                </a:solidFill>
+              </a:rPr>
+              <a:t>Parallel.For</a:t>
+            </a:r>
+            <a:endParaRPr lang="en-CA" dirty="0">
               <a:solidFill>
                 <a:schemeClr val="bg1"/>
               </a:solidFill>
@@ -10164,7 +10974,7 @@
         </p:nvSpPr>
         <p:spPr bwMode="auto">
           <a:xfrm>
-            <a:off x="3876040" y="4277400"/>
+            <a:off x="3876040" y="4085807"/>
             <a:ext cx="7386320" cy="2154436"/>
           </a:xfrm>
           <a:prstGeom prst="rect">
@@ -10981,6 +11791,13 @@
   <p:clrMapOvr>
     <a:masterClrMapping/>
   </p:clrMapOvr>
+  <p:timing>
+    <p:tnLst>
+      <p:par>
+        <p:cTn id="1" dur="indefinite" restart="never" nodeType="tmRoot"/>
+      </p:par>
+    </p:tnLst>
+  </p:timing>
 </p:sld>
 </file>
 
@@ -11277,6 +12094,13 @@
   <p:clrMapOvr>
     <a:masterClrMapping/>
   </p:clrMapOvr>
+  <p:timing>
+    <p:tnLst>
+      <p:par>
+        <p:cTn id="1" dur="indefinite" restart="never" nodeType="tmRoot"/>
+      </p:par>
+    </p:tnLst>
+  </p:timing>
 </p:sld>
 </file>
 
@@ -12428,6 +13252,13 @@
   <p:clrMapOvr>
     <a:masterClrMapping/>
   </p:clrMapOvr>
+  <p:timing>
+    <p:tnLst>
+      <p:par>
+        <p:cTn id="1" dur="indefinite" restart="never" nodeType="tmRoot"/>
+      </p:par>
+    </p:tnLst>
+  </p:timing>
 </p:sld>
 </file>
 
@@ -12628,7 +13459,7 @@
         </p:nvSpPr>
         <p:spPr bwMode="auto">
           <a:xfrm>
-            <a:off x="2402840" y="2890391"/>
+            <a:off x="1889397" y="2924076"/>
             <a:ext cx="7386320" cy="1077218"/>
           </a:xfrm>
           <a:prstGeom prst="rect">
@@ -13021,8 +13852,8 @@
         </p:nvSpPr>
         <p:spPr bwMode="auto">
           <a:xfrm>
-            <a:off x="2402840" y="4901655"/>
-            <a:ext cx="7386320" cy="1077218"/>
+            <a:off x="1375954" y="5117098"/>
+            <a:ext cx="8413206" cy="646331"/>
           </a:xfrm>
           <a:prstGeom prst="rect">
             <a:avLst/>
@@ -13137,18 +13968,46 @@
               <a:t> = </a:t>
             </a:r>
             <a:r>
+              <a:rPr kumimoji="0" lang="en-US" altLang="en-US" sz="1400" b="0" i="0" u="none" strike="noStrike" cap="none" normalizeH="0" dirty="0" err="1" smtClean="0">
+                <a:ln>
+                  <a:noFill/>
+                </a:ln>
+                <a:solidFill>
+                  <a:schemeClr val="accent1"/>
+                </a:solidFill>
+                <a:effectLst/>
+                <a:latin typeface="Consolas" panose="020B0609020204030204" pitchFamily="49" charset="0"/>
+                <a:cs typeface="Consolas" panose="020B0609020204030204" pitchFamily="49" charset="0"/>
+              </a:rPr>
+              <a:t>Task</a:t>
+            </a:r>
+            <a:r>
+              <a:rPr kumimoji="0" lang="en-US" altLang="en-US" sz="1400" b="0" i="0" u="none" strike="noStrike" cap="none" normalizeH="0" dirty="0" err="1" smtClean="0">
+                <a:ln>
+                  <a:noFill/>
+                </a:ln>
+                <a:solidFill>
+                  <a:srgbClr val="000000"/>
+                </a:solidFill>
+                <a:effectLst/>
+                <a:latin typeface="Consolas" panose="020B0609020204030204" pitchFamily="49" charset="0"/>
+                <a:cs typeface="Consolas" panose="020B0609020204030204" pitchFamily="49" charset="0"/>
+              </a:rPr>
+              <a:t>.Factory.StartNew</a:t>
+            </a:r>
+            <a:r>
               <a:rPr kumimoji="0" lang="en-US" altLang="en-US" sz="1400" b="0" i="0" u="none" strike="noStrike" cap="none" normalizeH="0" dirty="0" smtClean="0">
                 <a:ln>
                   <a:noFill/>
                 </a:ln>
                 <a:solidFill>
-                  <a:srgbClr val="0000FF"/>
-                </a:solidFill>
-                <a:effectLst/>
-                <a:latin typeface="Consolas" panose="020B0609020204030204" pitchFamily="49" charset="0"/>
-                <a:cs typeface="Consolas" panose="020B0609020204030204" pitchFamily="49" charset="0"/>
-              </a:rPr>
-              <a:t>new</a:t>
+                  <a:srgbClr val="000000"/>
+                </a:solidFill>
+                <a:effectLst/>
+                <a:latin typeface="Consolas" panose="020B0609020204030204" pitchFamily="49" charset="0"/>
+                <a:cs typeface="Consolas" panose="020B0609020204030204" pitchFamily="49" charset="0"/>
+              </a:rPr>
+              <a:t>( </a:t>
             </a:r>
             <a:r>
               <a:rPr kumimoji="0" lang="en-US" altLang="en-US" sz="1400" b="0" i="0" u="none" strike="noStrike" cap="none" normalizeH="0" dirty="0" smtClean="0">
@@ -13162,7 +14021,7 @@
                 <a:latin typeface="Consolas" panose="020B0609020204030204" pitchFamily="49" charset="0"/>
                 <a:cs typeface="Consolas" panose="020B0609020204030204" pitchFamily="49" charset="0"/>
               </a:rPr>
-              <a:t> Task( () =&gt; </a:t>
+              <a:t>() =&gt; </a:t>
             </a:r>
             <a:r>
               <a:rPr kumimoji="0" lang="en-US" altLang="en-US" sz="1400" b="0" i="0" u="none" strike="noStrike" cap="none" normalizeH="0" dirty="0" err="1" smtClean="0">
@@ -13274,134 +14133,6 @@
               <a:cs typeface="Consolas" panose="020B0609020204030204" pitchFamily="49" charset="0"/>
             </a:endParaRPr>
           </a:p>
-          <a:p>
-            <a:pPr marL="0" marR="0" lvl="0" indent="0" algn="l" defTabSz="914400" rtl="0" eaLnBrk="0" fontAlgn="base" latinLnBrk="0" hangingPunct="0">
-              <a:lnSpc>
-                <a:spcPct val="100000"/>
-              </a:lnSpc>
-              <a:spcBef>
-                <a:spcPct val="0"/>
-              </a:spcBef>
-              <a:spcAft>
-                <a:spcPct val="0"/>
-              </a:spcAft>
-              <a:buClrTx/>
-              <a:buSzTx/>
-              <a:buFontTx/>
-              <a:buNone/>
-              <a:tabLst/>
-            </a:pPr>
-            <a:r>
-              <a:rPr kumimoji="0" lang="en-US" altLang="en-US" sz="1400" b="0" i="0" u="none" strike="noStrike" cap="none" normalizeH="0" dirty="0" smtClean="0">
-                <a:ln>
-                  <a:noFill/>
-                </a:ln>
-                <a:solidFill>
-                  <a:srgbClr val="008000"/>
-                </a:solidFill>
-                <a:effectLst/>
-                <a:latin typeface="Consolas" panose="020B0609020204030204" pitchFamily="49" charset="0"/>
-                <a:cs typeface="Consolas" panose="020B0609020204030204" pitchFamily="49" charset="0"/>
-              </a:rPr>
-              <a:t> // Start the task.</a:t>
-            </a:r>
-            <a:r>
-              <a:rPr kumimoji="0" lang="en-US" altLang="en-US" sz="1400" b="0" i="0" u="none" strike="noStrike" cap="none" normalizeH="0" dirty="0" smtClean="0">
-                <a:ln>
-                  <a:noFill/>
-                </a:ln>
-                <a:solidFill>
-                  <a:srgbClr val="000000"/>
-                </a:solidFill>
-                <a:effectLst/>
-                <a:latin typeface="Consolas" panose="020B0609020204030204" pitchFamily="49" charset="0"/>
-                <a:cs typeface="Consolas" panose="020B0609020204030204" pitchFamily="49" charset="0"/>
-              </a:rPr>
-              <a:t> </a:t>
-            </a:r>
-          </a:p>
-          <a:p>
-            <a:pPr marL="0" marR="0" lvl="0" indent="0" algn="l" defTabSz="914400" rtl="0" eaLnBrk="0" fontAlgn="base" latinLnBrk="0" hangingPunct="0">
-              <a:lnSpc>
-                <a:spcPct val="100000"/>
-              </a:lnSpc>
-              <a:spcBef>
-                <a:spcPct val="0"/>
-              </a:spcBef>
-              <a:spcAft>
-                <a:spcPct val="0"/>
-              </a:spcAft>
-              <a:buClrTx/>
-              <a:buSzTx/>
-              <a:buFontTx/>
-              <a:buNone/>
-              <a:tabLst/>
-            </a:pPr>
-            <a:r>
-              <a:rPr kumimoji="0" lang="en-US" altLang="en-US" sz="1400" b="0" i="0" u="none" strike="noStrike" cap="none" normalizeH="0" dirty="0" smtClean="0">
-                <a:ln>
-                  <a:noFill/>
-                </a:ln>
-                <a:solidFill>
-                  <a:srgbClr val="000000"/>
-                </a:solidFill>
-                <a:effectLst/>
-                <a:latin typeface="Consolas" panose="020B0609020204030204" pitchFamily="49" charset="0"/>
-                <a:cs typeface="Consolas" panose="020B0609020204030204" pitchFamily="49" charset="0"/>
-              </a:rPr>
-              <a:t> </a:t>
-            </a:r>
-            <a:r>
-              <a:rPr kumimoji="0" lang="en-US" altLang="en-US" sz="1400" b="0" i="0" u="none" strike="noStrike" cap="none" normalizeH="0" dirty="0" err="1" smtClean="0">
-                <a:ln>
-                  <a:noFill/>
-                </a:ln>
-                <a:solidFill>
-                  <a:srgbClr val="000000"/>
-                </a:solidFill>
-                <a:effectLst/>
-                <a:latin typeface="Consolas" panose="020B0609020204030204" pitchFamily="49" charset="0"/>
-                <a:cs typeface="Consolas" panose="020B0609020204030204" pitchFamily="49" charset="0"/>
-              </a:rPr>
-              <a:t>taskA.Start</a:t>
-            </a:r>
-            <a:r>
-              <a:rPr kumimoji="0" lang="en-US" altLang="en-US" sz="1400" b="0" i="0" u="none" strike="noStrike" cap="none" normalizeH="0" dirty="0" smtClean="0">
-                <a:ln>
-                  <a:noFill/>
-                </a:ln>
-                <a:solidFill>
-                  <a:srgbClr val="000000"/>
-                </a:solidFill>
-                <a:effectLst/>
-                <a:latin typeface="Consolas" panose="020B0609020204030204" pitchFamily="49" charset="0"/>
-                <a:cs typeface="Consolas" panose="020B0609020204030204" pitchFamily="49" charset="0"/>
-              </a:rPr>
-              <a:t>();</a:t>
-            </a:r>
-            <a:r>
-              <a:rPr kumimoji="0" lang="en-US" altLang="en-US" sz="1400" b="0" i="0" u="none" strike="noStrike" cap="none" normalizeH="0" dirty="0" smtClean="0">
-                <a:ln>
-                  <a:noFill/>
-                </a:ln>
-                <a:solidFill>
-                  <a:schemeClr val="tx1"/>
-                </a:solidFill>
-                <a:effectLst/>
-              </a:rPr>
-              <a:t> </a:t>
-            </a:r>
-            <a:endParaRPr kumimoji="0" lang="en-US" altLang="en-US" sz="1400" b="0" i="0" u="none" strike="noStrike" cap="none" normalizeH="0" dirty="0" smtClean="0">
-              <a:ln>
-                <a:noFill/>
-              </a:ln>
-              <a:solidFill>
-                <a:schemeClr val="tx1"/>
-              </a:solidFill>
-              <a:effectLst/>
-              <a:latin typeface="Arial" panose="020B0604020202020204" pitchFamily="34" charset="0"/>
-            </a:endParaRPr>
-          </a:p>
         </p:txBody>
       </p:sp>
     </p:spTree>
@@ -13414,6 +14145,13 @@
   <p:clrMapOvr>
     <a:masterClrMapping/>
   </p:clrMapOvr>
+  <p:timing>
+    <p:tnLst>
+      <p:par>
+        <p:cTn id="1" dur="indefinite" restart="never" nodeType="tmRoot"/>
+      </p:par>
+    </p:tnLst>
+  </p:timing>
 </p:sld>
 </file>
 
@@ -13621,8 +14359,8 @@
         </p:nvSpPr>
         <p:spPr bwMode="auto">
           <a:xfrm>
-            <a:off x="1376680" y="3634244"/>
-            <a:ext cx="8950960" cy="2677656"/>
+            <a:off x="1376680" y="3741966"/>
+            <a:ext cx="8950960" cy="2462213"/>
           </a:xfrm>
           <a:prstGeom prst="rect">
             <a:avLst/>
@@ -13919,81 +14657,7 @@
                 <a:latin typeface="Consolas" panose="020B0609020204030204" pitchFamily="49" charset="0"/>
                 <a:cs typeface="Consolas" panose="020B0609020204030204" pitchFamily="49" charset="0"/>
               </a:rPr>
-              <a:t>                     </a:t>
-            </a:r>
-            <a:r>
-              <a:rPr kumimoji="0" lang="en-US" altLang="en-US" sz="1400" b="0" i="0" u="none" strike="noStrike" cap="none" normalizeH="0" baseline="0" dirty="0" err="1" smtClean="0">
-                <a:ln>
-                  <a:noFill/>
-                </a:ln>
-                <a:solidFill>
-                  <a:srgbClr val="2B91AF"/>
-                </a:solidFill>
-                <a:effectLst/>
-                <a:latin typeface="Consolas" panose="020B0609020204030204" pitchFamily="49" charset="0"/>
-                <a:cs typeface="Consolas" panose="020B0609020204030204" pitchFamily="49" charset="0"/>
-              </a:rPr>
-              <a:t>Thread</a:t>
-            </a:r>
-            <a:r>
-              <a:rPr kumimoji="0" lang="en-US" altLang="en-US" sz="1400" b="0" i="0" u="none" strike="noStrike" cap="none" normalizeH="0" baseline="0" dirty="0" err="1" smtClean="0">
-                <a:ln>
-                  <a:noFill/>
-                </a:ln>
-                <a:solidFill>
-                  <a:srgbClr val="000000"/>
-                </a:solidFill>
-                <a:effectLst/>
-                <a:latin typeface="Consolas" panose="020B0609020204030204" pitchFamily="49" charset="0"/>
-                <a:cs typeface="Consolas" panose="020B0609020204030204" pitchFamily="49" charset="0"/>
-              </a:rPr>
-              <a:t>.Sleep</a:t>
-            </a:r>
-            <a:r>
-              <a:rPr kumimoji="0" lang="en-US" altLang="en-US" sz="1400" b="0" i="0" u="none" strike="noStrike" cap="none" normalizeH="0" baseline="0" dirty="0" smtClean="0">
-                <a:ln>
-                  <a:noFill/>
-                </a:ln>
-                <a:solidFill>
-                  <a:srgbClr val="000000"/>
-                </a:solidFill>
-                <a:effectLst/>
-                <a:latin typeface="Consolas" panose="020B0609020204030204" pitchFamily="49" charset="0"/>
-                <a:cs typeface="Consolas" panose="020B0609020204030204" pitchFamily="49" charset="0"/>
-              </a:rPr>
-              <a:t>(100);</a:t>
-            </a:r>
-          </a:p>
-          <a:p>
-            <a:pPr marL="0" marR="0" lvl="0" indent="0" algn="l" defTabSz="914400" rtl="0" eaLnBrk="0" fontAlgn="base" latinLnBrk="0" hangingPunct="0">
-              <a:lnSpc>
-                <a:spcPct val="100000"/>
-              </a:lnSpc>
-              <a:spcBef>
-                <a:spcPct val="0"/>
-              </a:spcBef>
-              <a:spcAft>
-                <a:spcPct val="0"/>
-              </a:spcAft>
-              <a:buClrTx/>
-              <a:buSzTx/>
-              <a:buFontTx/>
-              <a:buNone/>
-              <a:tabLst/>
-            </a:pPr>
-            <a:r>
-              <a:rPr kumimoji="0" lang="en-US" altLang="en-US" sz="1400" b="0" i="0" u="none" strike="noStrike" cap="none" normalizeH="0" baseline="0" dirty="0" smtClean="0">
-                <a:ln>
-                  <a:noFill/>
-                </a:ln>
-                <a:solidFill>
-                  <a:srgbClr val="000000"/>
-                </a:solidFill>
-                <a:effectLst/>
-                <a:latin typeface="Consolas" panose="020B0609020204030204" pitchFamily="49" charset="0"/>
-                <a:cs typeface="Consolas" panose="020B0609020204030204" pitchFamily="49" charset="0"/>
-              </a:rPr>
-              <a:t>                 });</a:t>
+              <a:t>                });</a:t>
             </a:r>
           </a:p>
           <a:p>
@@ -14341,6 +15005,13 @@
   <p:clrMapOvr>
     <a:masterClrMapping/>
   </p:clrMapOvr>
+  <p:timing>
+    <p:tnLst>
+      <p:par>
+        <p:cTn id="1" dur="indefinite" restart="never" nodeType="tmRoot"/>
+      </p:par>
+    </p:tnLst>
+  </p:timing>
 </p:sld>
 </file>
 
@@ -14610,6 +15281,13 @@
   <p:clrMapOvr>
     <a:masterClrMapping/>
   </p:clrMapOvr>
+  <p:timing>
+    <p:tnLst>
+      <p:par>
+        <p:cTn id="1" dur="indefinite" restart="never" nodeType="tmRoot"/>
+      </p:par>
+    </p:tnLst>
+  </p:timing>
 </p:sld>
 </file>
 

</xml_diff>

<commit_message>
Clean up notes from PPT
</commit_message>
<xml_diff>
--- a/DevConnect-TPL.pptx
+++ b/DevConnect-TPL.pptx
@@ -27,7 +27,7 @@
     <p:sldId id="261" r:id="rId21"/>
   </p:sldIdLst>
   <p:sldSz cx="12192000" cy="6858000"/>
-  <p:notesSz cx="6858000" cy="9144000"/>
+  <p:notesSz cx="6950075" cy="9236075"/>
   <p:defaultTextStyle>
     <a:defPPr>
       <a:defRPr lang="en-US"/>
@@ -166,14 +166,14 @@
         <p:spPr>
           <a:xfrm>
             <a:off x="0" y="0"/>
-            <a:ext cx="2971800" cy="458788"/>
+            <a:ext cx="3011699" cy="463408"/>
           </a:xfrm>
           <a:prstGeom prst="rect">
             <a:avLst/>
           </a:prstGeom>
         </p:spPr>
         <p:txBody>
-          <a:bodyPr vert="horz" lIns="91440" tIns="45720" rIns="91440" bIns="45720" rtlCol="0"/>
+          <a:bodyPr vert="horz" lIns="92492" tIns="46246" rIns="92492" bIns="46246" rtlCol="0"/>
           <a:lstStyle>
             <a:lvl1pPr algn="l">
               <a:defRPr sz="1200"/>
@@ -196,15 +196,15 @@
         </p:nvSpPr>
         <p:spPr>
           <a:xfrm>
-            <a:off x="3884613" y="0"/>
-            <a:ext cx="2971800" cy="458788"/>
+            <a:off x="3936768" y="0"/>
+            <a:ext cx="3011699" cy="463408"/>
           </a:xfrm>
           <a:prstGeom prst="rect">
             <a:avLst/>
           </a:prstGeom>
         </p:spPr>
         <p:txBody>
-          <a:bodyPr vert="horz" lIns="91440" tIns="45720" rIns="91440" bIns="45720" rtlCol="0"/>
+          <a:bodyPr vert="horz" lIns="92492" tIns="46246" rIns="92492" bIns="46246" rtlCol="0"/>
           <a:lstStyle>
             <a:lvl1pPr algn="r">
               <a:defRPr sz="1200"/>
@@ -213,7 +213,7 @@
           <a:p>
             <a:fld id="{4D5FD042-8C11-4D58-BAF1-BDADAE6DCF6D}" type="datetimeFigureOut">
               <a:rPr lang="en-CA" smtClean="0"/>
-              <a:t>16/02/2015</a:t>
+              <a:t>17/02/2015</a:t>
             </a:fld>
             <a:endParaRPr lang="en-CA"/>
           </a:p>
@@ -231,8 +231,8 @@
         </p:nvSpPr>
         <p:spPr>
           <a:xfrm>
-            <a:off x="685800" y="1143000"/>
-            <a:ext cx="5486400" cy="3086100"/>
+            <a:off x="703263" y="1154113"/>
+            <a:ext cx="5543550" cy="3117850"/>
           </a:xfrm>
           <a:prstGeom prst="rect">
             <a:avLst/>
@@ -245,7 +245,7 @@
           </a:ln>
         </p:spPr>
         <p:txBody>
-          <a:bodyPr vert="horz" lIns="91440" tIns="45720" rIns="91440" bIns="45720" rtlCol="0" anchor="ctr"/>
+          <a:bodyPr vert="horz" lIns="92492" tIns="46246" rIns="92492" bIns="46246" rtlCol="0" anchor="ctr"/>
           <a:lstStyle/>
           <a:p>
             <a:endParaRPr lang="en-CA"/>
@@ -264,15 +264,15 @@
         </p:nvSpPr>
         <p:spPr>
           <a:xfrm>
-            <a:off x="685800" y="4400550"/>
-            <a:ext cx="5486400" cy="3600450"/>
+            <a:off x="695008" y="4444861"/>
+            <a:ext cx="5560060" cy="3636705"/>
           </a:xfrm>
           <a:prstGeom prst="rect">
             <a:avLst/>
           </a:prstGeom>
         </p:spPr>
         <p:txBody>
-          <a:bodyPr vert="horz" lIns="91440" tIns="45720" rIns="91440" bIns="45720" rtlCol="0"/>
+          <a:bodyPr vert="horz" lIns="92492" tIns="46246" rIns="92492" bIns="46246" rtlCol="0"/>
           <a:lstStyle/>
           <a:p>
             <a:pPr lvl="0"/>
@@ -324,15 +324,15 @@
         </p:nvSpPr>
         <p:spPr>
           <a:xfrm>
-            <a:off x="0" y="8685213"/>
-            <a:ext cx="2971800" cy="458787"/>
+            <a:off x="0" y="8772669"/>
+            <a:ext cx="3011699" cy="463407"/>
           </a:xfrm>
           <a:prstGeom prst="rect">
             <a:avLst/>
           </a:prstGeom>
         </p:spPr>
         <p:txBody>
-          <a:bodyPr vert="horz" lIns="91440" tIns="45720" rIns="91440" bIns="45720" rtlCol="0" anchor="b"/>
+          <a:bodyPr vert="horz" lIns="92492" tIns="46246" rIns="92492" bIns="46246" rtlCol="0" anchor="b"/>
           <a:lstStyle>
             <a:lvl1pPr algn="l">
               <a:defRPr sz="1200"/>
@@ -355,15 +355,15 @@
         </p:nvSpPr>
         <p:spPr>
           <a:xfrm>
-            <a:off x="3884613" y="8685213"/>
-            <a:ext cx="2971800" cy="458787"/>
+            <a:off x="3936768" y="8772669"/>
+            <a:ext cx="3011699" cy="463407"/>
           </a:xfrm>
           <a:prstGeom prst="rect">
             <a:avLst/>
           </a:prstGeom>
         </p:spPr>
         <p:txBody>
-          <a:bodyPr vert="horz" lIns="91440" tIns="45720" rIns="91440" bIns="45720" rtlCol="0" anchor="b"/>
+          <a:bodyPr vert="horz" lIns="92492" tIns="46246" rIns="92492" bIns="46246" rtlCol="0" anchor="b"/>
           <a:lstStyle>
             <a:lvl1pPr algn="r">
               <a:defRPr sz="1200"/>
@@ -482,6 +482,510 @@
 </file>
 
 <file path=ppt/notesSlides/notesSlide1.xml><?xml version="1.0" encoding="utf-8"?>
+<p:notes xmlns:a="http://schemas.openxmlformats.org/drawingml/2006/main" xmlns:r="http://schemas.openxmlformats.org/officeDocument/2006/relationships" xmlns:p="http://schemas.openxmlformats.org/presentationml/2006/main">
+  <p:cSld>
+    <p:spTree>
+      <p:nvGrpSpPr>
+        <p:cNvPr id="1" name=""/>
+        <p:cNvGrpSpPr/>
+        <p:nvPr/>
+      </p:nvGrpSpPr>
+      <p:grpSpPr>
+        <a:xfrm>
+          <a:off x="0" y="0"/>
+          <a:ext cx="0" cy="0"/>
+          <a:chOff x="0" y="0"/>
+          <a:chExt cx="0" cy="0"/>
+        </a:xfrm>
+      </p:grpSpPr>
+      <p:sp>
+        <p:nvSpPr>
+          <p:cNvPr id="2" name="Slide Image Placeholder 1"/>
+          <p:cNvSpPr>
+            <a:spLocks noGrp="1" noRot="1" noChangeAspect="1"/>
+          </p:cNvSpPr>
+          <p:nvPr>
+            <p:ph type="sldImg"/>
+          </p:nvPr>
+        </p:nvSpPr>
+        <p:spPr/>
+      </p:sp>
+      <p:sp>
+        <p:nvSpPr>
+          <p:cNvPr id="3" name="Notes Placeholder 2"/>
+          <p:cNvSpPr>
+            <a:spLocks noGrp="1"/>
+          </p:cNvSpPr>
+          <p:nvPr>
+            <p:ph type="body" idx="1"/>
+          </p:nvPr>
+        </p:nvSpPr>
+        <p:spPr/>
+        <p:txBody>
+          <a:bodyPr/>
+          <a:lstStyle/>
+          <a:p>
+            <a:endParaRPr lang="en-CA"/>
+          </a:p>
+        </p:txBody>
+      </p:sp>
+      <p:sp>
+        <p:nvSpPr>
+          <p:cNvPr id="4" name="Slide Number Placeholder 3"/>
+          <p:cNvSpPr>
+            <a:spLocks noGrp="1"/>
+          </p:cNvSpPr>
+          <p:nvPr>
+            <p:ph type="sldNum" sz="quarter" idx="10"/>
+          </p:nvPr>
+        </p:nvSpPr>
+        <p:spPr/>
+        <p:txBody>
+          <a:bodyPr/>
+          <a:lstStyle/>
+          <a:p>
+            <a:fld id="{4C88F005-AEB4-4A06-83F1-F72227828CB2}" type="slidenum">
+              <a:rPr lang="en-CA" smtClean="0"/>
+              <a:t>1</a:t>
+            </a:fld>
+            <a:endParaRPr lang="en-CA"/>
+          </a:p>
+        </p:txBody>
+      </p:sp>
+    </p:spTree>
+    <p:extLst>
+      <p:ext uri="{BB962C8B-B14F-4D97-AF65-F5344CB8AC3E}">
+        <p14:creationId xmlns:p14="http://schemas.microsoft.com/office/powerpoint/2010/main" val="1279375090"/>
+      </p:ext>
+    </p:extLst>
+  </p:cSld>
+  <p:clrMapOvr>
+    <a:masterClrMapping/>
+  </p:clrMapOvr>
+</p:notes>
+</file>
+
+<file path=ppt/notesSlides/notesSlide10.xml><?xml version="1.0" encoding="utf-8"?>
+<p:notes xmlns:a="http://schemas.openxmlformats.org/drawingml/2006/main" xmlns:r="http://schemas.openxmlformats.org/officeDocument/2006/relationships" xmlns:p="http://schemas.openxmlformats.org/presentationml/2006/main">
+  <p:cSld>
+    <p:spTree>
+      <p:nvGrpSpPr>
+        <p:cNvPr id="1" name=""/>
+        <p:cNvGrpSpPr/>
+        <p:nvPr/>
+      </p:nvGrpSpPr>
+      <p:grpSpPr>
+        <a:xfrm>
+          <a:off x="0" y="0"/>
+          <a:ext cx="0" cy="0"/>
+          <a:chOff x="0" y="0"/>
+          <a:chExt cx="0" cy="0"/>
+        </a:xfrm>
+      </p:grpSpPr>
+      <p:sp>
+        <p:nvSpPr>
+          <p:cNvPr id="2" name="Slide Image Placeholder 1"/>
+          <p:cNvSpPr>
+            <a:spLocks noGrp="1" noRot="1" noChangeAspect="1"/>
+          </p:cNvSpPr>
+          <p:nvPr>
+            <p:ph type="sldImg"/>
+          </p:nvPr>
+        </p:nvSpPr>
+        <p:spPr/>
+      </p:sp>
+      <p:sp>
+        <p:nvSpPr>
+          <p:cNvPr id="3" name="Notes Placeholder 2"/>
+          <p:cNvSpPr>
+            <a:spLocks noGrp="1"/>
+          </p:cNvSpPr>
+          <p:nvPr>
+            <p:ph type="body" idx="1"/>
+          </p:nvPr>
+        </p:nvSpPr>
+        <p:spPr/>
+        <p:txBody>
+          <a:bodyPr/>
+          <a:lstStyle/>
+          <a:p>
+            <a:endParaRPr lang="en-CA"/>
+          </a:p>
+        </p:txBody>
+      </p:sp>
+      <p:sp>
+        <p:nvSpPr>
+          <p:cNvPr id="4" name="Slide Number Placeholder 3"/>
+          <p:cNvSpPr>
+            <a:spLocks noGrp="1"/>
+          </p:cNvSpPr>
+          <p:nvPr>
+            <p:ph type="sldNum" sz="quarter" idx="10"/>
+          </p:nvPr>
+        </p:nvSpPr>
+        <p:spPr/>
+        <p:txBody>
+          <a:bodyPr/>
+          <a:lstStyle/>
+          <a:p>
+            <a:fld id="{4C88F005-AEB4-4A06-83F1-F72227828CB2}" type="slidenum">
+              <a:rPr lang="en-CA" smtClean="0"/>
+              <a:t>10</a:t>
+            </a:fld>
+            <a:endParaRPr lang="en-CA"/>
+          </a:p>
+        </p:txBody>
+      </p:sp>
+    </p:spTree>
+    <p:extLst>
+      <p:ext uri="{BB962C8B-B14F-4D97-AF65-F5344CB8AC3E}">
+        <p14:creationId xmlns:p14="http://schemas.microsoft.com/office/powerpoint/2010/main" val="3584531934"/>
+      </p:ext>
+    </p:extLst>
+  </p:cSld>
+  <p:clrMapOvr>
+    <a:masterClrMapping/>
+  </p:clrMapOvr>
+</p:notes>
+</file>
+
+<file path=ppt/notesSlides/notesSlide11.xml><?xml version="1.0" encoding="utf-8"?>
+<p:notes xmlns:a="http://schemas.openxmlformats.org/drawingml/2006/main" xmlns:r="http://schemas.openxmlformats.org/officeDocument/2006/relationships" xmlns:p="http://schemas.openxmlformats.org/presentationml/2006/main">
+  <p:cSld>
+    <p:spTree>
+      <p:nvGrpSpPr>
+        <p:cNvPr id="1" name=""/>
+        <p:cNvGrpSpPr/>
+        <p:nvPr/>
+      </p:nvGrpSpPr>
+      <p:grpSpPr>
+        <a:xfrm>
+          <a:off x="0" y="0"/>
+          <a:ext cx="0" cy="0"/>
+          <a:chOff x="0" y="0"/>
+          <a:chExt cx="0" cy="0"/>
+        </a:xfrm>
+      </p:grpSpPr>
+      <p:sp>
+        <p:nvSpPr>
+          <p:cNvPr id="2" name="Slide Image Placeholder 1"/>
+          <p:cNvSpPr>
+            <a:spLocks noGrp="1" noRot="1" noChangeAspect="1"/>
+          </p:cNvSpPr>
+          <p:nvPr>
+            <p:ph type="sldImg"/>
+          </p:nvPr>
+        </p:nvSpPr>
+        <p:spPr/>
+      </p:sp>
+      <p:sp>
+        <p:nvSpPr>
+          <p:cNvPr id="3" name="Notes Placeholder 2"/>
+          <p:cNvSpPr>
+            <a:spLocks noGrp="1"/>
+          </p:cNvSpPr>
+          <p:nvPr>
+            <p:ph type="body" idx="1"/>
+          </p:nvPr>
+        </p:nvSpPr>
+        <p:spPr/>
+        <p:txBody>
+          <a:bodyPr/>
+          <a:lstStyle/>
+          <a:p>
+            <a:endParaRPr lang="en-CA"/>
+          </a:p>
+        </p:txBody>
+      </p:sp>
+      <p:sp>
+        <p:nvSpPr>
+          <p:cNvPr id="4" name="Slide Number Placeholder 3"/>
+          <p:cNvSpPr>
+            <a:spLocks noGrp="1"/>
+          </p:cNvSpPr>
+          <p:nvPr>
+            <p:ph type="sldNum" sz="quarter" idx="10"/>
+          </p:nvPr>
+        </p:nvSpPr>
+        <p:spPr/>
+        <p:txBody>
+          <a:bodyPr/>
+          <a:lstStyle/>
+          <a:p>
+            <a:fld id="{4C88F005-AEB4-4A06-83F1-F72227828CB2}" type="slidenum">
+              <a:rPr lang="en-CA" smtClean="0"/>
+              <a:t>11</a:t>
+            </a:fld>
+            <a:endParaRPr lang="en-CA"/>
+          </a:p>
+        </p:txBody>
+      </p:sp>
+    </p:spTree>
+    <p:extLst>
+      <p:ext uri="{BB962C8B-B14F-4D97-AF65-F5344CB8AC3E}">
+        <p14:creationId xmlns:p14="http://schemas.microsoft.com/office/powerpoint/2010/main" val="4072553904"/>
+      </p:ext>
+    </p:extLst>
+  </p:cSld>
+  <p:clrMapOvr>
+    <a:masterClrMapping/>
+  </p:clrMapOvr>
+</p:notes>
+</file>
+
+<file path=ppt/notesSlides/notesSlide12.xml><?xml version="1.0" encoding="utf-8"?>
+<p:notes xmlns:a="http://schemas.openxmlformats.org/drawingml/2006/main" xmlns:r="http://schemas.openxmlformats.org/officeDocument/2006/relationships" xmlns:p="http://schemas.openxmlformats.org/presentationml/2006/main">
+  <p:cSld>
+    <p:spTree>
+      <p:nvGrpSpPr>
+        <p:cNvPr id="1" name=""/>
+        <p:cNvGrpSpPr/>
+        <p:nvPr/>
+      </p:nvGrpSpPr>
+      <p:grpSpPr>
+        <a:xfrm>
+          <a:off x="0" y="0"/>
+          <a:ext cx="0" cy="0"/>
+          <a:chOff x="0" y="0"/>
+          <a:chExt cx="0" cy="0"/>
+        </a:xfrm>
+      </p:grpSpPr>
+      <p:sp>
+        <p:nvSpPr>
+          <p:cNvPr id="2" name="Slide Image Placeholder 1"/>
+          <p:cNvSpPr>
+            <a:spLocks noGrp="1" noRot="1" noChangeAspect="1"/>
+          </p:cNvSpPr>
+          <p:nvPr>
+            <p:ph type="sldImg"/>
+          </p:nvPr>
+        </p:nvSpPr>
+        <p:spPr/>
+      </p:sp>
+      <p:sp>
+        <p:nvSpPr>
+          <p:cNvPr id="3" name="Notes Placeholder 2"/>
+          <p:cNvSpPr>
+            <a:spLocks noGrp="1"/>
+          </p:cNvSpPr>
+          <p:nvPr>
+            <p:ph type="body" idx="1"/>
+          </p:nvPr>
+        </p:nvSpPr>
+        <p:spPr/>
+        <p:txBody>
+          <a:bodyPr/>
+          <a:lstStyle/>
+          <a:p>
+            <a:endParaRPr lang="en-CA"/>
+          </a:p>
+        </p:txBody>
+      </p:sp>
+      <p:sp>
+        <p:nvSpPr>
+          <p:cNvPr id="4" name="Slide Number Placeholder 3"/>
+          <p:cNvSpPr>
+            <a:spLocks noGrp="1"/>
+          </p:cNvSpPr>
+          <p:nvPr>
+            <p:ph type="sldNum" sz="quarter" idx="10"/>
+          </p:nvPr>
+        </p:nvSpPr>
+        <p:spPr/>
+        <p:txBody>
+          <a:bodyPr/>
+          <a:lstStyle/>
+          <a:p>
+            <a:fld id="{4C88F005-AEB4-4A06-83F1-F72227828CB2}" type="slidenum">
+              <a:rPr lang="en-CA" smtClean="0"/>
+              <a:t>12</a:t>
+            </a:fld>
+            <a:endParaRPr lang="en-CA"/>
+          </a:p>
+        </p:txBody>
+      </p:sp>
+    </p:spTree>
+    <p:extLst>
+      <p:ext uri="{BB962C8B-B14F-4D97-AF65-F5344CB8AC3E}">
+        <p14:creationId xmlns:p14="http://schemas.microsoft.com/office/powerpoint/2010/main" val="38881654"/>
+      </p:ext>
+    </p:extLst>
+  </p:cSld>
+  <p:clrMapOvr>
+    <a:masterClrMapping/>
+  </p:clrMapOvr>
+</p:notes>
+</file>
+
+<file path=ppt/notesSlides/notesSlide13.xml><?xml version="1.0" encoding="utf-8"?>
+<p:notes xmlns:a="http://schemas.openxmlformats.org/drawingml/2006/main" xmlns:r="http://schemas.openxmlformats.org/officeDocument/2006/relationships" xmlns:p="http://schemas.openxmlformats.org/presentationml/2006/main">
+  <p:cSld>
+    <p:spTree>
+      <p:nvGrpSpPr>
+        <p:cNvPr id="1" name=""/>
+        <p:cNvGrpSpPr/>
+        <p:nvPr/>
+      </p:nvGrpSpPr>
+      <p:grpSpPr>
+        <a:xfrm>
+          <a:off x="0" y="0"/>
+          <a:ext cx="0" cy="0"/>
+          <a:chOff x="0" y="0"/>
+          <a:chExt cx="0" cy="0"/>
+        </a:xfrm>
+      </p:grpSpPr>
+      <p:sp>
+        <p:nvSpPr>
+          <p:cNvPr id="2" name="Slide Image Placeholder 1"/>
+          <p:cNvSpPr>
+            <a:spLocks noGrp="1" noRot="1" noChangeAspect="1"/>
+          </p:cNvSpPr>
+          <p:nvPr>
+            <p:ph type="sldImg"/>
+          </p:nvPr>
+        </p:nvSpPr>
+        <p:spPr/>
+      </p:sp>
+      <p:sp>
+        <p:nvSpPr>
+          <p:cNvPr id="3" name="Notes Placeholder 2"/>
+          <p:cNvSpPr>
+            <a:spLocks noGrp="1"/>
+          </p:cNvSpPr>
+          <p:nvPr>
+            <p:ph type="body" idx="1"/>
+          </p:nvPr>
+        </p:nvSpPr>
+        <p:spPr/>
+        <p:txBody>
+          <a:bodyPr/>
+          <a:lstStyle/>
+          <a:p>
+            <a:endParaRPr lang="en-CA"/>
+          </a:p>
+        </p:txBody>
+      </p:sp>
+      <p:sp>
+        <p:nvSpPr>
+          <p:cNvPr id="4" name="Slide Number Placeholder 3"/>
+          <p:cNvSpPr>
+            <a:spLocks noGrp="1"/>
+          </p:cNvSpPr>
+          <p:nvPr>
+            <p:ph type="sldNum" sz="quarter" idx="10"/>
+          </p:nvPr>
+        </p:nvSpPr>
+        <p:spPr/>
+        <p:txBody>
+          <a:bodyPr/>
+          <a:lstStyle/>
+          <a:p>
+            <a:fld id="{4C88F005-AEB4-4A06-83F1-F72227828CB2}" type="slidenum">
+              <a:rPr lang="en-CA" smtClean="0"/>
+              <a:t>13</a:t>
+            </a:fld>
+            <a:endParaRPr lang="en-CA"/>
+          </a:p>
+        </p:txBody>
+      </p:sp>
+    </p:spTree>
+    <p:extLst>
+      <p:ext uri="{BB962C8B-B14F-4D97-AF65-F5344CB8AC3E}">
+        <p14:creationId xmlns:p14="http://schemas.microsoft.com/office/powerpoint/2010/main" val="3342301610"/>
+      </p:ext>
+    </p:extLst>
+  </p:cSld>
+  <p:clrMapOvr>
+    <a:masterClrMapping/>
+  </p:clrMapOvr>
+</p:notes>
+</file>
+
+<file path=ppt/notesSlides/notesSlide14.xml><?xml version="1.0" encoding="utf-8"?>
+<p:notes xmlns:a="http://schemas.openxmlformats.org/drawingml/2006/main" xmlns:r="http://schemas.openxmlformats.org/officeDocument/2006/relationships" xmlns:p="http://schemas.openxmlformats.org/presentationml/2006/main">
+  <p:cSld>
+    <p:spTree>
+      <p:nvGrpSpPr>
+        <p:cNvPr id="1" name=""/>
+        <p:cNvGrpSpPr/>
+        <p:nvPr/>
+      </p:nvGrpSpPr>
+      <p:grpSpPr>
+        <a:xfrm>
+          <a:off x="0" y="0"/>
+          <a:ext cx="0" cy="0"/>
+          <a:chOff x="0" y="0"/>
+          <a:chExt cx="0" cy="0"/>
+        </a:xfrm>
+      </p:grpSpPr>
+      <p:sp>
+        <p:nvSpPr>
+          <p:cNvPr id="2" name="Slide Image Placeholder 1"/>
+          <p:cNvSpPr>
+            <a:spLocks noGrp="1" noRot="1" noChangeAspect="1"/>
+          </p:cNvSpPr>
+          <p:nvPr>
+            <p:ph type="sldImg"/>
+          </p:nvPr>
+        </p:nvSpPr>
+        <p:spPr/>
+      </p:sp>
+      <p:sp>
+        <p:nvSpPr>
+          <p:cNvPr id="3" name="Notes Placeholder 2"/>
+          <p:cNvSpPr>
+            <a:spLocks noGrp="1"/>
+          </p:cNvSpPr>
+          <p:nvPr>
+            <p:ph type="body" idx="1"/>
+          </p:nvPr>
+        </p:nvSpPr>
+        <p:spPr/>
+        <p:txBody>
+          <a:bodyPr/>
+          <a:lstStyle/>
+          <a:p>
+            <a:endParaRPr lang="en-CA"/>
+          </a:p>
+        </p:txBody>
+      </p:sp>
+      <p:sp>
+        <p:nvSpPr>
+          <p:cNvPr id="4" name="Slide Number Placeholder 3"/>
+          <p:cNvSpPr>
+            <a:spLocks noGrp="1"/>
+          </p:cNvSpPr>
+          <p:nvPr>
+            <p:ph type="sldNum" sz="quarter" idx="10"/>
+          </p:nvPr>
+        </p:nvSpPr>
+        <p:spPr/>
+        <p:txBody>
+          <a:bodyPr/>
+          <a:lstStyle/>
+          <a:p>
+            <a:fld id="{4C88F005-AEB4-4A06-83F1-F72227828CB2}" type="slidenum">
+              <a:rPr lang="en-CA" smtClean="0"/>
+              <a:t>14</a:t>
+            </a:fld>
+            <a:endParaRPr lang="en-CA"/>
+          </a:p>
+        </p:txBody>
+      </p:sp>
+    </p:spTree>
+    <p:extLst>
+      <p:ext uri="{BB962C8B-B14F-4D97-AF65-F5344CB8AC3E}">
+        <p14:creationId xmlns:p14="http://schemas.microsoft.com/office/powerpoint/2010/main" val="3692017672"/>
+      </p:ext>
+    </p:extLst>
+  </p:cSld>
+  <p:clrMapOvr>
+    <a:masterClrMapping/>
+  </p:clrMapOvr>
+</p:notes>
+</file>
+
+<file path=ppt/notesSlides/notesSlide15.xml><?xml version="1.0" encoding="utf-8"?>
 <p:notes xmlns:a="http://schemas.openxmlformats.org/drawingml/2006/main" xmlns:r="http://schemas.openxmlformats.org/officeDocument/2006/relationships" xmlns:p="http://schemas.openxmlformats.org/presentationml/2006/main" showMasterSp="0" showMasterPhAnim="0">
   <p:cSld>
     <p:spTree>
@@ -510,8 +1014,8 @@
         </p:nvSpPr>
         <p:spPr>
           <a:xfrm>
-            <a:off x="381000" y="685800"/>
-            <a:ext cx="6096000" cy="3429000"/>
+            <a:off x="395288" y="692150"/>
+            <a:ext cx="6159500" cy="3463925"/>
           </a:xfrm>
           <a:custGeom>
             <a:avLst/>
@@ -561,29 +1065,20 @@
         </p:nvSpPr>
         <p:spPr>
           <a:xfrm>
-            <a:off x="685800" y="4343400"/>
-            <a:ext cx="5486399" cy="4114800"/>
+            <a:off x="695008" y="4387136"/>
+            <a:ext cx="5560059" cy="4156234"/>
           </a:xfrm>
           <a:prstGeom prst="rect">
             <a:avLst/>
           </a:prstGeom>
         </p:spPr>
         <p:txBody>
-          <a:bodyPr lIns="91425" tIns="91425" rIns="91425" bIns="91425" anchor="t" anchorCtr="0">
+          <a:bodyPr lIns="92476" tIns="92476" rIns="92476" bIns="92476" anchor="t" anchorCtr="0">
             <a:noAutofit/>
           </a:bodyPr>
           <a:lstStyle/>
           <a:p>
-            <a:pPr>
-              <a:spcBef>
-                <a:spcPts val="0"/>
-              </a:spcBef>
-              <a:buNone/>
-            </a:pPr>
-            <a:r>
-              <a:rPr lang="en"/>
-              <a:t>I started developing software since high school, I then went onto to Conestoga College for the Software Engineering Technology course for 4 years, 16 months of which was spent at Magnet, and I’ve been working at Magnet since I graduated early last year.</a:t>
-            </a:r>
+            <a:endParaRPr lang="en" dirty="0"/>
           </a:p>
         </p:txBody>
       </p:sp>
@@ -600,7 +1095,91 @@
 </p:notes>
 </file>
 
-<file path=ppt/notesSlides/notesSlide2.xml><?xml version="1.0" encoding="utf-8"?>
+<file path=ppt/notesSlides/notesSlide16.xml><?xml version="1.0" encoding="utf-8"?>
+<p:notes xmlns:a="http://schemas.openxmlformats.org/drawingml/2006/main" xmlns:r="http://schemas.openxmlformats.org/officeDocument/2006/relationships" xmlns:p="http://schemas.openxmlformats.org/presentationml/2006/main">
+  <p:cSld>
+    <p:spTree>
+      <p:nvGrpSpPr>
+        <p:cNvPr id="1" name=""/>
+        <p:cNvGrpSpPr/>
+        <p:nvPr/>
+      </p:nvGrpSpPr>
+      <p:grpSpPr>
+        <a:xfrm>
+          <a:off x="0" y="0"/>
+          <a:ext cx="0" cy="0"/>
+          <a:chOff x="0" y="0"/>
+          <a:chExt cx="0" cy="0"/>
+        </a:xfrm>
+      </p:grpSpPr>
+      <p:sp>
+        <p:nvSpPr>
+          <p:cNvPr id="2" name="Slide Image Placeholder 1"/>
+          <p:cNvSpPr>
+            <a:spLocks noGrp="1" noRot="1" noChangeAspect="1"/>
+          </p:cNvSpPr>
+          <p:nvPr>
+            <p:ph type="sldImg"/>
+          </p:nvPr>
+        </p:nvSpPr>
+        <p:spPr/>
+      </p:sp>
+      <p:sp>
+        <p:nvSpPr>
+          <p:cNvPr id="3" name="Notes Placeholder 2"/>
+          <p:cNvSpPr>
+            <a:spLocks noGrp="1"/>
+          </p:cNvSpPr>
+          <p:nvPr>
+            <p:ph type="body" idx="1"/>
+          </p:nvPr>
+        </p:nvSpPr>
+        <p:spPr/>
+        <p:txBody>
+          <a:bodyPr/>
+          <a:lstStyle/>
+          <a:p>
+            <a:endParaRPr lang="en-CA"/>
+          </a:p>
+        </p:txBody>
+      </p:sp>
+      <p:sp>
+        <p:nvSpPr>
+          <p:cNvPr id="4" name="Slide Number Placeholder 3"/>
+          <p:cNvSpPr>
+            <a:spLocks noGrp="1"/>
+          </p:cNvSpPr>
+          <p:nvPr>
+            <p:ph type="sldNum" sz="quarter" idx="10"/>
+          </p:nvPr>
+        </p:nvSpPr>
+        <p:spPr/>
+        <p:txBody>
+          <a:bodyPr/>
+          <a:lstStyle/>
+          <a:p>
+            <a:fld id="{4C88F005-AEB4-4A06-83F1-F72227828CB2}" type="slidenum">
+              <a:rPr lang="en-CA" smtClean="0"/>
+              <a:t>16</a:t>
+            </a:fld>
+            <a:endParaRPr lang="en-CA"/>
+          </a:p>
+        </p:txBody>
+      </p:sp>
+    </p:spTree>
+    <p:extLst>
+      <p:ext uri="{BB962C8B-B14F-4D97-AF65-F5344CB8AC3E}">
+        <p14:creationId xmlns:p14="http://schemas.microsoft.com/office/powerpoint/2010/main" val="4054246628"/>
+      </p:ext>
+    </p:extLst>
+  </p:cSld>
+  <p:clrMapOvr>
+    <a:masterClrMapping/>
+  </p:clrMapOvr>
+</p:notes>
+</file>
+
+<file path=ppt/notesSlides/notesSlide17.xml><?xml version="1.0" encoding="utf-8"?>
 <p:notes xmlns:a="http://schemas.openxmlformats.org/drawingml/2006/main" xmlns:r="http://schemas.openxmlformats.org/officeDocument/2006/relationships" xmlns:p="http://schemas.openxmlformats.org/presentationml/2006/main" showMasterSp="0" showMasterPhAnim="0">
   <p:cSld>
     <p:spTree>
@@ -629,8 +1208,8 @@
         </p:nvSpPr>
         <p:spPr>
           <a:xfrm>
-            <a:off x="381000" y="685800"/>
-            <a:ext cx="6096000" cy="3429000"/>
+            <a:off x="395288" y="692150"/>
+            <a:ext cx="6159500" cy="3463925"/>
           </a:xfrm>
           <a:custGeom>
             <a:avLst/>
@@ -680,29 +1259,20 @@
         </p:nvSpPr>
         <p:spPr>
           <a:xfrm>
-            <a:off x="685800" y="4343400"/>
-            <a:ext cx="5486399" cy="4114800"/>
+            <a:off x="695008" y="4387136"/>
+            <a:ext cx="5560059" cy="4156234"/>
           </a:xfrm>
           <a:prstGeom prst="rect">
             <a:avLst/>
           </a:prstGeom>
         </p:spPr>
         <p:txBody>
-          <a:bodyPr lIns="91425" tIns="91425" rIns="91425" bIns="91425" anchor="t" anchorCtr="0">
+          <a:bodyPr lIns="92476" tIns="92476" rIns="92476" bIns="92476" anchor="t" anchorCtr="0">
             <a:noAutofit/>
           </a:bodyPr>
           <a:lstStyle/>
           <a:p>
-            <a:pPr>
-              <a:spcBef>
-                <a:spcPts val="0"/>
-              </a:spcBef>
-              <a:buNone/>
-            </a:pPr>
-            <a:r>
-              <a:rPr lang="en"/>
-              <a:t>I started developing software since high school, I then went onto to Conestoga College for the Software Engineering Technology course for 4 years, 16 months of which was spent at Magnet, and I’ve been working at Magnet since I graduated early last year.</a:t>
-            </a:r>
+            <a:endParaRPr lang="en" dirty="0"/>
           </a:p>
         </p:txBody>
       </p:sp>
@@ -710,6 +1280,678 @@
     <p:extLst>
       <p:ext uri="{BB962C8B-B14F-4D97-AF65-F5344CB8AC3E}">
         <p14:creationId xmlns:p14="http://schemas.microsoft.com/office/powerpoint/2010/main" val="798364789"/>
+      </p:ext>
+    </p:extLst>
+  </p:cSld>
+  <p:clrMapOvr>
+    <a:masterClrMapping/>
+  </p:clrMapOvr>
+</p:notes>
+</file>
+
+<file path=ppt/notesSlides/notesSlide2.xml><?xml version="1.0" encoding="utf-8"?>
+<p:notes xmlns:a="http://schemas.openxmlformats.org/drawingml/2006/main" xmlns:r="http://schemas.openxmlformats.org/officeDocument/2006/relationships" xmlns:p="http://schemas.openxmlformats.org/presentationml/2006/main">
+  <p:cSld>
+    <p:spTree>
+      <p:nvGrpSpPr>
+        <p:cNvPr id="1" name=""/>
+        <p:cNvGrpSpPr/>
+        <p:nvPr/>
+      </p:nvGrpSpPr>
+      <p:grpSpPr>
+        <a:xfrm>
+          <a:off x="0" y="0"/>
+          <a:ext cx="0" cy="0"/>
+          <a:chOff x="0" y="0"/>
+          <a:chExt cx="0" cy="0"/>
+        </a:xfrm>
+      </p:grpSpPr>
+      <p:sp>
+        <p:nvSpPr>
+          <p:cNvPr id="2" name="Slide Image Placeholder 1"/>
+          <p:cNvSpPr>
+            <a:spLocks noGrp="1" noRot="1" noChangeAspect="1"/>
+          </p:cNvSpPr>
+          <p:nvPr>
+            <p:ph type="sldImg"/>
+          </p:nvPr>
+        </p:nvSpPr>
+        <p:spPr/>
+      </p:sp>
+      <p:sp>
+        <p:nvSpPr>
+          <p:cNvPr id="3" name="Notes Placeholder 2"/>
+          <p:cNvSpPr>
+            <a:spLocks noGrp="1"/>
+          </p:cNvSpPr>
+          <p:nvPr>
+            <p:ph type="body" idx="1"/>
+          </p:nvPr>
+        </p:nvSpPr>
+        <p:spPr/>
+        <p:txBody>
+          <a:bodyPr/>
+          <a:lstStyle/>
+          <a:p>
+            <a:endParaRPr lang="en-CA"/>
+          </a:p>
+        </p:txBody>
+      </p:sp>
+      <p:sp>
+        <p:nvSpPr>
+          <p:cNvPr id="4" name="Slide Number Placeholder 3"/>
+          <p:cNvSpPr>
+            <a:spLocks noGrp="1"/>
+          </p:cNvSpPr>
+          <p:nvPr>
+            <p:ph type="sldNum" sz="quarter" idx="10"/>
+          </p:nvPr>
+        </p:nvSpPr>
+        <p:spPr/>
+        <p:txBody>
+          <a:bodyPr/>
+          <a:lstStyle/>
+          <a:p>
+            <a:fld id="{4C88F005-AEB4-4A06-83F1-F72227828CB2}" type="slidenum">
+              <a:rPr lang="en-CA" smtClean="0"/>
+              <a:t>2</a:t>
+            </a:fld>
+            <a:endParaRPr lang="en-CA"/>
+          </a:p>
+        </p:txBody>
+      </p:sp>
+    </p:spTree>
+    <p:extLst>
+      <p:ext uri="{BB962C8B-B14F-4D97-AF65-F5344CB8AC3E}">
+        <p14:creationId xmlns:p14="http://schemas.microsoft.com/office/powerpoint/2010/main" val="1655196230"/>
+      </p:ext>
+    </p:extLst>
+  </p:cSld>
+  <p:clrMapOvr>
+    <a:masterClrMapping/>
+  </p:clrMapOvr>
+</p:notes>
+</file>
+
+<file path=ppt/notesSlides/notesSlide3.xml><?xml version="1.0" encoding="utf-8"?>
+<p:notes xmlns:a="http://schemas.openxmlformats.org/drawingml/2006/main" xmlns:r="http://schemas.openxmlformats.org/officeDocument/2006/relationships" xmlns:p="http://schemas.openxmlformats.org/presentationml/2006/main">
+  <p:cSld>
+    <p:spTree>
+      <p:nvGrpSpPr>
+        <p:cNvPr id="1" name=""/>
+        <p:cNvGrpSpPr/>
+        <p:nvPr/>
+      </p:nvGrpSpPr>
+      <p:grpSpPr>
+        <a:xfrm>
+          <a:off x="0" y="0"/>
+          <a:ext cx="0" cy="0"/>
+          <a:chOff x="0" y="0"/>
+          <a:chExt cx="0" cy="0"/>
+        </a:xfrm>
+      </p:grpSpPr>
+      <p:sp>
+        <p:nvSpPr>
+          <p:cNvPr id="2" name="Slide Image Placeholder 1"/>
+          <p:cNvSpPr>
+            <a:spLocks noGrp="1" noRot="1" noChangeAspect="1"/>
+          </p:cNvSpPr>
+          <p:nvPr>
+            <p:ph type="sldImg"/>
+          </p:nvPr>
+        </p:nvSpPr>
+        <p:spPr/>
+      </p:sp>
+      <p:sp>
+        <p:nvSpPr>
+          <p:cNvPr id="3" name="Notes Placeholder 2"/>
+          <p:cNvSpPr>
+            <a:spLocks noGrp="1"/>
+          </p:cNvSpPr>
+          <p:nvPr>
+            <p:ph type="body" idx="1"/>
+          </p:nvPr>
+        </p:nvSpPr>
+        <p:spPr/>
+        <p:txBody>
+          <a:bodyPr/>
+          <a:lstStyle/>
+          <a:p>
+            <a:endParaRPr lang="en-CA"/>
+          </a:p>
+        </p:txBody>
+      </p:sp>
+      <p:sp>
+        <p:nvSpPr>
+          <p:cNvPr id="4" name="Slide Number Placeholder 3"/>
+          <p:cNvSpPr>
+            <a:spLocks noGrp="1"/>
+          </p:cNvSpPr>
+          <p:nvPr>
+            <p:ph type="sldNum" sz="quarter" idx="10"/>
+          </p:nvPr>
+        </p:nvSpPr>
+        <p:spPr/>
+        <p:txBody>
+          <a:bodyPr/>
+          <a:lstStyle/>
+          <a:p>
+            <a:fld id="{4C88F005-AEB4-4A06-83F1-F72227828CB2}" type="slidenum">
+              <a:rPr lang="en-CA" smtClean="0"/>
+              <a:t>3</a:t>
+            </a:fld>
+            <a:endParaRPr lang="en-CA"/>
+          </a:p>
+        </p:txBody>
+      </p:sp>
+    </p:spTree>
+    <p:extLst>
+      <p:ext uri="{BB962C8B-B14F-4D97-AF65-F5344CB8AC3E}">
+        <p14:creationId xmlns:p14="http://schemas.microsoft.com/office/powerpoint/2010/main" val="2136936087"/>
+      </p:ext>
+    </p:extLst>
+  </p:cSld>
+  <p:clrMapOvr>
+    <a:masterClrMapping/>
+  </p:clrMapOvr>
+</p:notes>
+</file>
+
+<file path=ppt/notesSlides/notesSlide4.xml><?xml version="1.0" encoding="utf-8"?>
+<p:notes xmlns:a="http://schemas.openxmlformats.org/drawingml/2006/main" xmlns:r="http://schemas.openxmlformats.org/officeDocument/2006/relationships" xmlns:p="http://schemas.openxmlformats.org/presentationml/2006/main">
+  <p:cSld>
+    <p:spTree>
+      <p:nvGrpSpPr>
+        <p:cNvPr id="1" name=""/>
+        <p:cNvGrpSpPr/>
+        <p:nvPr/>
+      </p:nvGrpSpPr>
+      <p:grpSpPr>
+        <a:xfrm>
+          <a:off x="0" y="0"/>
+          <a:ext cx="0" cy="0"/>
+          <a:chOff x="0" y="0"/>
+          <a:chExt cx="0" cy="0"/>
+        </a:xfrm>
+      </p:grpSpPr>
+      <p:sp>
+        <p:nvSpPr>
+          <p:cNvPr id="2" name="Slide Image Placeholder 1"/>
+          <p:cNvSpPr>
+            <a:spLocks noGrp="1" noRot="1" noChangeAspect="1"/>
+          </p:cNvSpPr>
+          <p:nvPr>
+            <p:ph type="sldImg"/>
+          </p:nvPr>
+        </p:nvSpPr>
+        <p:spPr/>
+      </p:sp>
+      <p:sp>
+        <p:nvSpPr>
+          <p:cNvPr id="3" name="Notes Placeholder 2"/>
+          <p:cNvSpPr>
+            <a:spLocks noGrp="1"/>
+          </p:cNvSpPr>
+          <p:nvPr>
+            <p:ph type="body" idx="1"/>
+          </p:nvPr>
+        </p:nvSpPr>
+        <p:spPr/>
+        <p:txBody>
+          <a:bodyPr/>
+          <a:lstStyle/>
+          <a:p>
+            <a:endParaRPr lang="en-CA"/>
+          </a:p>
+        </p:txBody>
+      </p:sp>
+      <p:sp>
+        <p:nvSpPr>
+          <p:cNvPr id="4" name="Slide Number Placeholder 3"/>
+          <p:cNvSpPr>
+            <a:spLocks noGrp="1"/>
+          </p:cNvSpPr>
+          <p:nvPr>
+            <p:ph type="sldNum" sz="quarter" idx="10"/>
+          </p:nvPr>
+        </p:nvSpPr>
+        <p:spPr/>
+        <p:txBody>
+          <a:bodyPr/>
+          <a:lstStyle/>
+          <a:p>
+            <a:fld id="{4C88F005-AEB4-4A06-83F1-F72227828CB2}" type="slidenum">
+              <a:rPr lang="en-CA" smtClean="0"/>
+              <a:t>4</a:t>
+            </a:fld>
+            <a:endParaRPr lang="en-CA"/>
+          </a:p>
+        </p:txBody>
+      </p:sp>
+    </p:spTree>
+    <p:extLst>
+      <p:ext uri="{BB962C8B-B14F-4D97-AF65-F5344CB8AC3E}">
+        <p14:creationId xmlns:p14="http://schemas.microsoft.com/office/powerpoint/2010/main" val="326449445"/>
+      </p:ext>
+    </p:extLst>
+  </p:cSld>
+  <p:clrMapOvr>
+    <a:masterClrMapping/>
+  </p:clrMapOvr>
+</p:notes>
+</file>
+
+<file path=ppt/notesSlides/notesSlide5.xml><?xml version="1.0" encoding="utf-8"?>
+<p:notes xmlns:a="http://schemas.openxmlformats.org/drawingml/2006/main" xmlns:r="http://schemas.openxmlformats.org/officeDocument/2006/relationships" xmlns:p="http://schemas.openxmlformats.org/presentationml/2006/main">
+  <p:cSld>
+    <p:spTree>
+      <p:nvGrpSpPr>
+        <p:cNvPr id="1" name=""/>
+        <p:cNvGrpSpPr/>
+        <p:nvPr/>
+      </p:nvGrpSpPr>
+      <p:grpSpPr>
+        <a:xfrm>
+          <a:off x="0" y="0"/>
+          <a:ext cx="0" cy="0"/>
+          <a:chOff x="0" y="0"/>
+          <a:chExt cx="0" cy="0"/>
+        </a:xfrm>
+      </p:grpSpPr>
+      <p:sp>
+        <p:nvSpPr>
+          <p:cNvPr id="2" name="Slide Image Placeholder 1"/>
+          <p:cNvSpPr>
+            <a:spLocks noGrp="1" noRot="1" noChangeAspect="1"/>
+          </p:cNvSpPr>
+          <p:nvPr>
+            <p:ph type="sldImg"/>
+          </p:nvPr>
+        </p:nvSpPr>
+        <p:spPr/>
+      </p:sp>
+      <p:sp>
+        <p:nvSpPr>
+          <p:cNvPr id="3" name="Notes Placeholder 2"/>
+          <p:cNvSpPr>
+            <a:spLocks noGrp="1"/>
+          </p:cNvSpPr>
+          <p:nvPr>
+            <p:ph type="body" idx="1"/>
+          </p:nvPr>
+        </p:nvSpPr>
+        <p:spPr/>
+        <p:txBody>
+          <a:bodyPr/>
+          <a:lstStyle/>
+          <a:p>
+            <a:endParaRPr lang="en-CA"/>
+          </a:p>
+        </p:txBody>
+      </p:sp>
+      <p:sp>
+        <p:nvSpPr>
+          <p:cNvPr id="4" name="Slide Number Placeholder 3"/>
+          <p:cNvSpPr>
+            <a:spLocks noGrp="1"/>
+          </p:cNvSpPr>
+          <p:nvPr>
+            <p:ph type="sldNum" sz="quarter" idx="10"/>
+          </p:nvPr>
+        </p:nvSpPr>
+        <p:spPr/>
+        <p:txBody>
+          <a:bodyPr/>
+          <a:lstStyle/>
+          <a:p>
+            <a:fld id="{4C88F005-AEB4-4A06-83F1-F72227828CB2}" type="slidenum">
+              <a:rPr lang="en-CA" smtClean="0"/>
+              <a:t>5</a:t>
+            </a:fld>
+            <a:endParaRPr lang="en-CA"/>
+          </a:p>
+        </p:txBody>
+      </p:sp>
+    </p:spTree>
+    <p:extLst>
+      <p:ext uri="{BB962C8B-B14F-4D97-AF65-F5344CB8AC3E}">
+        <p14:creationId xmlns:p14="http://schemas.microsoft.com/office/powerpoint/2010/main" val="190620431"/>
+      </p:ext>
+    </p:extLst>
+  </p:cSld>
+  <p:clrMapOvr>
+    <a:masterClrMapping/>
+  </p:clrMapOvr>
+</p:notes>
+</file>
+
+<file path=ppt/notesSlides/notesSlide6.xml><?xml version="1.0" encoding="utf-8"?>
+<p:notes xmlns:a="http://schemas.openxmlformats.org/drawingml/2006/main" xmlns:r="http://schemas.openxmlformats.org/officeDocument/2006/relationships" xmlns:p="http://schemas.openxmlformats.org/presentationml/2006/main">
+  <p:cSld>
+    <p:spTree>
+      <p:nvGrpSpPr>
+        <p:cNvPr id="1" name=""/>
+        <p:cNvGrpSpPr/>
+        <p:nvPr/>
+      </p:nvGrpSpPr>
+      <p:grpSpPr>
+        <a:xfrm>
+          <a:off x="0" y="0"/>
+          <a:ext cx="0" cy="0"/>
+          <a:chOff x="0" y="0"/>
+          <a:chExt cx="0" cy="0"/>
+        </a:xfrm>
+      </p:grpSpPr>
+      <p:sp>
+        <p:nvSpPr>
+          <p:cNvPr id="2" name="Slide Image Placeholder 1"/>
+          <p:cNvSpPr>
+            <a:spLocks noGrp="1" noRot="1" noChangeAspect="1"/>
+          </p:cNvSpPr>
+          <p:nvPr>
+            <p:ph type="sldImg"/>
+          </p:nvPr>
+        </p:nvSpPr>
+        <p:spPr/>
+      </p:sp>
+      <p:sp>
+        <p:nvSpPr>
+          <p:cNvPr id="3" name="Notes Placeholder 2"/>
+          <p:cNvSpPr>
+            <a:spLocks noGrp="1"/>
+          </p:cNvSpPr>
+          <p:nvPr>
+            <p:ph type="body" idx="1"/>
+          </p:nvPr>
+        </p:nvSpPr>
+        <p:spPr/>
+        <p:txBody>
+          <a:bodyPr/>
+          <a:lstStyle/>
+          <a:p>
+            <a:endParaRPr lang="en-CA"/>
+          </a:p>
+        </p:txBody>
+      </p:sp>
+      <p:sp>
+        <p:nvSpPr>
+          <p:cNvPr id="4" name="Slide Number Placeholder 3"/>
+          <p:cNvSpPr>
+            <a:spLocks noGrp="1"/>
+          </p:cNvSpPr>
+          <p:nvPr>
+            <p:ph type="sldNum" sz="quarter" idx="10"/>
+          </p:nvPr>
+        </p:nvSpPr>
+        <p:spPr/>
+        <p:txBody>
+          <a:bodyPr/>
+          <a:lstStyle/>
+          <a:p>
+            <a:fld id="{4C88F005-AEB4-4A06-83F1-F72227828CB2}" type="slidenum">
+              <a:rPr lang="en-CA" smtClean="0"/>
+              <a:t>6</a:t>
+            </a:fld>
+            <a:endParaRPr lang="en-CA"/>
+          </a:p>
+        </p:txBody>
+      </p:sp>
+    </p:spTree>
+    <p:extLst>
+      <p:ext uri="{BB962C8B-B14F-4D97-AF65-F5344CB8AC3E}">
+        <p14:creationId xmlns:p14="http://schemas.microsoft.com/office/powerpoint/2010/main" val="2386959087"/>
+      </p:ext>
+    </p:extLst>
+  </p:cSld>
+  <p:clrMapOvr>
+    <a:masterClrMapping/>
+  </p:clrMapOvr>
+</p:notes>
+</file>
+
+<file path=ppt/notesSlides/notesSlide7.xml><?xml version="1.0" encoding="utf-8"?>
+<p:notes xmlns:a="http://schemas.openxmlformats.org/drawingml/2006/main" xmlns:r="http://schemas.openxmlformats.org/officeDocument/2006/relationships" xmlns:p="http://schemas.openxmlformats.org/presentationml/2006/main">
+  <p:cSld>
+    <p:spTree>
+      <p:nvGrpSpPr>
+        <p:cNvPr id="1" name=""/>
+        <p:cNvGrpSpPr/>
+        <p:nvPr/>
+      </p:nvGrpSpPr>
+      <p:grpSpPr>
+        <a:xfrm>
+          <a:off x="0" y="0"/>
+          <a:ext cx="0" cy="0"/>
+          <a:chOff x="0" y="0"/>
+          <a:chExt cx="0" cy="0"/>
+        </a:xfrm>
+      </p:grpSpPr>
+      <p:sp>
+        <p:nvSpPr>
+          <p:cNvPr id="2" name="Slide Image Placeholder 1"/>
+          <p:cNvSpPr>
+            <a:spLocks noGrp="1" noRot="1" noChangeAspect="1"/>
+          </p:cNvSpPr>
+          <p:nvPr>
+            <p:ph type="sldImg"/>
+          </p:nvPr>
+        </p:nvSpPr>
+        <p:spPr/>
+      </p:sp>
+      <p:sp>
+        <p:nvSpPr>
+          <p:cNvPr id="3" name="Notes Placeholder 2"/>
+          <p:cNvSpPr>
+            <a:spLocks noGrp="1"/>
+          </p:cNvSpPr>
+          <p:nvPr>
+            <p:ph type="body" idx="1"/>
+          </p:nvPr>
+        </p:nvSpPr>
+        <p:spPr/>
+        <p:txBody>
+          <a:bodyPr/>
+          <a:lstStyle/>
+          <a:p>
+            <a:endParaRPr lang="en-CA"/>
+          </a:p>
+        </p:txBody>
+      </p:sp>
+      <p:sp>
+        <p:nvSpPr>
+          <p:cNvPr id="4" name="Slide Number Placeholder 3"/>
+          <p:cNvSpPr>
+            <a:spLocks noGrp="1"/>
+          </p:cNvSpPr>
+          <p:nvPr>
+            <p:ph type="sldNum" sz="quarter" idx="10"/>
+          </p:nvPr>
+        </p:nvSpPr>
+        <p:spPr/>
+        <p:txBody>
+          <a:bodyPr/>
+          <a:lstStyle/>
+          <a:p>
+            <a:fld id="{4C88F005-AEB4-4A06-83F1-F72227828CB2}" type="slidenum">
+              <a:rPr lang="en-CA" smtClean="0"/>
+              <a:t>7</a:t>
+            </a:fld>
+            <a:endParaRPr lang="en-CA"/>
+          </a:p>
+        </p:txBody>
+      </p:sp>
+    </p:spTree>
+    <p:extLst>
+      <p:ext uri="{BB962C8B-B14F-4D97-AF65-F5344CB8AC3E}">
+        <p14:creationId xmlns:p14="http://schemas.microsoft.com/office/powerpoint/2010/main" val="2667465854"/>
+      </p:ext>
+    </p:extLst>
+  </p:cSld>
+  <p:clrMapOvr>
+    <a:masterClrMapping/>
+  </p:clrMapOvr>
+</p:notes>
+</file>
+
+<file path=ppt/notesSlides/notesSlide8.xml><?xml version="1.0" encoding="utf-8"?>
+<p:notes xmlns:a="http://schemas.openxmlformats.org/drawingml/2006/main" xmlns:r="http://schemas.openxmlformats.org/officeDocument/2006/relationships" xmlns:p="http://schemas.openxmlformats.org/presentationml/2006/main">
+  <p:cSld>
+    <p:spTree>
+      <p:nvGrpSpPr>
+        <p:cNvPr id="1" name=""/>
+        <p:cNvGrpSpPr/>
+        <p:nvPr/>
+      </p:nvGrpSpPr>
+      <p:grpSpPr>
+        <a:xfrm>
+          <a:off x="0" y="0"/>
+          <a:ext cx="0" cy="0"/>
+          <a:chOff x="0" y="0"/>
+          <a:chExt cx="0" cy="0"/>
+        </a:xfrm>
+      </p:grpSpPr>
+      <p:sp>
+        <p:nvSpPr>
+          <p:cNvPr id="2" name="Slide Image Placeholder 1"/>
+          <p:cNvSpPr>
+            <a:spLocks noGrp="1" noRot="1" noChangeAspect="1"/>
+          </p:cNvSpPr>
+          <p:nvPr>
+            <p:ph type="sldImg"/>
+          </p:nvPr>
+        </p:nvSpPr>
+        <p:spPr/>
+      </p:sp>
+      <p:sp>
+        <p:nvSpPr>
+          <p:cNvPr id="3" name="Notes Placeholder 2"/>
+          <p:cNvSpPr>
+            <a:spLocks noGrp="1"/>
+          </p:cNvSpPr>
+          <p:nvPr>
+            <p:ph type="body" idx="1"/>
+          </p:nvPr>
+        </p:nvSpPr>
+        <p:spPr/>
+        <p:txBody>
+          <a:bodyPr/>
+          <a:lstStyle/>
+          <a:p>
+            <a:endParaRPr lang="en-CA"/>
+          </a:p>
+        </p:txBody>
+      </p:sp>
+      <p:sp>
+        <p:nvSpPr>
+          <p:cNvPr id="4" name="Slide Number Placeholder 3"/>
+          <p:cNvSpPr>
+            <a:spLocks noGrp="1"/>
+          </p:cNvSpPr>
+          <p:nvPr>
+            <p:ph type="sldNum" sz="quarter" idx="10"/>
+          </p:nvPr>
+        </p:nvSpPr>
+        <p:spPr/>
+        <p:txBody>
+          <a:bodyPr/>
+          <a:lstStyle/>
+          <a:p>
+            <a:fld id="{4C88F005-AEB4-4A06-83F1-F72227828CB2}" type="slidenum">
+              <a:rPr lang="en-CA" smtClean="0"/>
+              <a:t>8</a:t>
+            </a:fld>
+            <a:endParaRPr lang="en-CA"/>
+          </a:p>
+        </p:txBody>
+      </p:sp>
+    </p:spTree>
+    <p:extLst>
+      <p:ext uri="{BB962C8B-B14F-4D97-AF65-F5344CB8AC3E}">
+        <p14:creationId xmlns:p14="http://schemas.microsoft.com/office/powerpoint/2010/main" val="3262297186"/>
+      </p:ext>
+    </p:extLst>
+  </p:cSld>
+  <p:clrMapOvr>
+    <a:masterClrMapping/>
+  </p:clrMapOvr>
+</p:notes>
+</file>
+
+<file path=ppt/notesSlides/notesSlide9.xml><?xml version="1.0" encoding="utf-8"?>
+<p:notes xmlns:a="http://schemas.openxmlformats.org/drawingml/2006/main" xmlns:r="http://schemas.openxmlformats.org/officeDocument/2006/relationships" xmlns:p="http://schemas.openxmlformats.org/presentationml/2006/main">
+  <p:cSld>
+    <p:spTree>
+      <p:nvGrpSpPr>
+        <p:cNvPr id="1" name=""/>
+        <p:cNvGrpSpPr/>
+        <p:nvPr/>
+      </p:nvGrpSpPr>
+      <p:grpSpPr>
+        <a:xfrm>
+          <a:off x="0" y="0"/>
+          <a:ext cx="0" cy="0"/>
+          <a:chOff x="0" y="0"/>
+          <a:chExt cx="0" cy="0"/>
+        </a:xfrm>
+      </p:grpSpPr>
+      <p:sp>
+        <p:nvSpPr>
+          <p:cNvPr id="2" name="Slide Image Placeholder 1"/>
+          <p:cNvSpPr>
+            <a:spLocks noGrp="1" noRot="1" noChangeAspect="1"/>
+          </p:cNvSpPr>
+          <p:nvPr>
+            <p:ph type="sldImg"/>
+          </p:nvPr>
+        </p:nvSpPr>
+        <p:spPr/>
+      </p:sp>
+      <p:sp>
+        <p:nvSpPr>
+          <p:cNvPr id="3" name="Notes Placeholder 2"/>
+          <p:cNvSpPr>
+            <a:spLocks noGrp="1"/>
+          </p:cNvSpPr>
+          <p:nvPr>
+            <p:ph type="body" idx="1"/>
+          </p:nvPr>
+        </p:nvSpPr>
+        <p:spPr/>
+        <p:txBody>
+          <a:bodyPr/>
+          <a:lstStyle/>
+          <a:p>
+            <a:endParaRPr lang="en-CA"/>
+          </a:p>
+        </p:txBody>
+      </p:sp>
+      <p:sp>
+        <p:nvSpPr>
+          <p:cNvPr id="4" name="Slide Number Placeholder 3"/>
+          <p:cNvSpPr>
+            <a:spLocks noGrp="1"/>
+          </p:cNvSpPr>
+          <p:nvPr>
+            <p:ph type="sldNum" sz="quarter" idx="10"/>
+          </p:nvPr>
+        </p:nvSpPr>
+        <p:spPr/>
+        <p:txBody>
+          <a:bodyPr/>
+          <a:lstStyle/>
+          <a:p>
+            <a:fld id="{4C88F005-AEB4-4A06-83F1-F72227828CB2}" type="slidenum">
+              <a:rPr lang="en-CA" smtClean="0"/>
+              <a:t>9</a:t>
+            </a:fld>
+            <a:endParaRPr lang="en-CA"/>
+          </a:p>
+        </p:txBody>
+      </p:sp>
+    </p:spTree>
+    <p:extLst>
+      <p:ext uri="{BB962C8B-B14F-4D97-AF65-F5344CB8AC3E}">
+        <p14:creationId xmlns:p14="http://schemas.microsoft.com/office/powerpoint/2010/main" val="4038547485"/>
       </p:ext>
     </p:extLst>
   </p:cSld>
@@ -850,7 +2092,7 @@
           <a:p>
             <a:fld id="{C0DCBFAD-FF79-4C6B-95FB-8BD6198459C0}" type="datetimeFigureOut">
               <a:rPr lang="en-CA" smtClean="0"/>
-              <a:t>16/02/2015</a:t>
+              <a:t>17/02/2015</a:t>
             </a:fld>
             <a:endParaRPr lang="en-CA"/>
           </a:p>
@@ -1020,7 +2262,7 @@
           <a:p>
             <a:fld id="{C0DCBFAD-FF79-4C6B-95FB-8BD6198459C0}" type="datetimeFigureOut">
               <a:rPr lang="en-CA" smtClean="0"/>
-              <a:t>16/02/2015</a:t>
+              <a:t>17/02/2015</a:t>
             </a:fld>
             <a:endParaRPr lang="en-CA"/>
           </a:p>
@@ -1200,7 +2442,7 @@
           <a:p>
             <a:fld id="{C0DCBFAD-FF79-4C6B-95FB-8BD6198459C0}" type="datetimeFigureOut">
               <a:rPr lang="en-CA" smtClean="0"/>
-              <a:t>16/02/2015</a:t>
+              <a:t>17/02/2015</a:t>
             </a:fld>
             <a:endParaRPr lang="en-CA"/>
           </a:p>
@@ -1606,7 +2848,7 @@
           <a:p>
             <a:fld id="{C0DCBFAD-FF79-4C6B-95FB-8BD6198459C0}" type="datetimeFigureOut">
               <a:rPr lang="en-CA" smtClean="0"/>
-              <a:t>16/02/2015</a:t>
+              <a:t>17/02/2015</a:t>
             </a:fld>
             <a:endParaRPr lang="en-CA"/>
           </a:p>
@@ -1852,7 +3094,7 @@
           <a:p>
             <a:fld id="{C0DCBFAD-FF79-4C6B-95FB-8BD6198459C0}" type="datetimeFigureOut">
               <a:rPr lang="en-CA" smtClean="0"/>
-              <a:t>16/02/2015</a:t>
+              <a:t>17/02/2015</a:t>
             </a:fld>
             <a:endParaRPr lang="en-CA"/>
           </a:p>
@@ -2084,7 +3326,7 @@
           <a:p>
             <a:fld id="{C0DCBFAD-FF79-4C6B-95FB-8BD6198459C0}" type="datetimeFigureOut">
               <a:rPr lang="en-CA" smtClean="0"/>
-              <a:t>16/02/2015</a:t>
+              <a:t>17/02/2015</a:t>
             </a:fld>
             <a:endParaRPr lang="en-CA"/>
           </a:p>
@@ -2451,7 +3693,7 @@
           <a:p>
             <a:fld id="{C0DCBFAD-FF79-4C6B-95FB-8BD6198459C0}" type="datetimeFigureOut">
               <a:rPr lang="en-CA" smtClean="0"/>
-              <a:t>16/02/2015</a:t>
+              <a:t>17/02/2015</a:t>
             </a:fld>
             <a:endParaRPr lang="en-CA"/>
           </a:p>
@@ -2569,7 +3811,7 @@
           <a:p>
             <a:fld id="{C0DCBFAD-FF79-4C6B-95FB-8BD6198459C0}" type="datetimeFigureOut">
               <a:rPr lang="en-CA" smtClean="0"/>
-              <a:t>16/02/2015</a:t>
+              <a:t>17/02/2015</a:t>
             </a:fld>
             <a:endParaRPr lang="en-CA"/>
           </a:p>
@@ -2664,7 +3906,7 @@
           <a:p>
             <a:fld id="{C0DCBFAD-FF79-4C6B-95FB-8BD6198459C0}" type="datetimeFigureOut">
               <a:rPr lang="en-CA" smtClean="0"/>
-              <a:t>16/02/2015</a:t>
+              <a:t>17/02/2015</a:t>
             </a:fld>
             <a:endParaRPr lang="en-CA"/>
           </a:p>
@@ -2941,7 +4183,7 @@
           <a:p>
             <a:fld id="{C0DCBFAD-FF79-4C6B-95FB-8BD6198459C0}" type="datetimeFigureOut">
               <a:rPr lang="en-CA" smtClean="0"/>
-              <a:t>16/02/2015</a:t>
+              <a:t>17/02/2015</a:t>
             </a:fld>
             <a:endParaRPr lang="en-CA"/>
           </a:p>
@@ -3194,7 +4436,7 @@
           <a:p>
             <a:fld id="{C0DCBFAD-FF79-4C6B-95FB-8BD6198459C0}" type="datetimeFigureOut">
               <a:rPr lang="en-CA" smtClean="0"/>
-              <a:t>16/02/2015</a:t>
+              <a:t>17/02/2015</a:t>
             </a:fld>
             <a:endParaRPr lang="en-CA"/>
           </a:p>
@@ -3407,7 +4649,7 @@
           <a:p>
             <a:fld id="{C0DCBFAD-FF79-4C6B-95FB-8BD6198459C0}" type="datetimeFigureOut">
               <a:rPr lang="en-CA" smtClean="0"/>
-              <a:t>16/02/2015</a:t>
+              <a:t>17/02/2015</a:t>
             </a:fld>
             <a:endParaRPr lang="en-CA"/>
           </a:p>
@@ -3822,7 +5064,7 @@
           <p:nvPr/>
         </p:nvPicPr>
         <p:blipFill>
-          <a:blip r:embed="rId2">
+          <a:blip r:embed="rId3">
             <a:extLst>
               <a:ext uri="{28A0092B-C50C-407E-A947-70E740481C1C}">
                 <a14:useLocalDpi xmlns:a14="http://schemas.microsoft.com/office/drawing/2010/main" val="0"/>
@@ -3855,7 +5097,7 @@
         </p:nvSpPr>
         <p:spPr>
           <a:xfrm>
-            <a:off x="1523999" y="2079285"/>
+            <a:off x="1523999" y="1607997"/>
             <a:ext cx="9144000" cy="2217180"/>
           </a:xfrm>
         </p:spPr>
@@ -3955,7 +5197,7 @@
         </p:nvSpPr>
         <p:spPr>
           <a:xfrm>
-            <a:off x="1636143" y="4574693"/>
+            <a:off x="1544553" y="3838578"/>
             <a:ext cx="9144000" cy="932258"/>
           </a:xfrm>
         </p:spPr>
@@ -4107,7 +5349,7 @@
             <p:nvPr/>
           </p:nvPicPr>
           <p:blipFill>
-            <a:blip r:embed="rId3">
+            <a:blip r:embed="rId4">
               <a:extLst>
                 <a:ext uri="{28A0092B-C50C-407E-A947-70E740481C1C}">
                   <a14:useLocalDpi xmlns:a14="http://schemas.microsoft.com/office/drawing/2010/main" val="0"/>
@@ -4201,7 +5443,7 @@
                 <a:solidFill>
                   <a:srgbClr val="FFFFFF"/>
                 </a:solidFill>
-                <a:hlinkClick r:id="rId4"/>
+                <a:hlinkClick r:id="rId5"/>
               </a:rPr>
               <a:t>https://github.com/CSharpDevConnect/</a:t>
             </a:r>
@@ -4222,7 +5464,7 @@
           <p:nvPr/>
         </p:nvPicPr>
         <p:blipFill>
-          <a:blip r:embed="rId5" cstate="print">
+          <a:blip r:embed="rId6" cstate="print">
             <a:extLst>
               <a:ext uri="{28A0092B-C50C-407E-A947-70E740481C1C}">
                 <a14:useLocalDpi xmlns:a14="http://schemas.microsoft.com/office/drawing/2010/main" val="0"/>
@@ -4254,7 +5496,7 @@
           <p:nvPr/>
         </p:nvPicPr>
         <p:blipFill>
-          <a:blip r:embed="rId6">
+          <a:blip r:embed="rId7">
             <a:extLst>
               <a:ext uri="{28A0092B-C50C-407E-A947-70E740481C1C}">
                 <a14:useLocalDpi xmlns:a14="http://schemas.microsoft.com/office/drawing/2010/main" val="0"/>
@@ -4321,7 +5563,7 @@
           <p:nvPr/>
         </p:nvPicPr>
         <p:blipFill>
-          <a:blip r:embed="rId2">
+          <a:blip r:embed="rId3">
             <a:extLst>
               <a:ext uri="{28A0092B-C50C-407E-A947-70E740481C1C}">
                 <a14:useLocalDpi xmlns:a14="http://schemas.microsoft.com/office/drawing/2010/main" val="0"/>
@@ -5193,6 +6435,13 @@
   <p:clrMapOvr>
     <a:masterClrMapping/>
   </p:clrMapOvr>
+  <p:timing>
+    <p:tnLst>
+      <p:par>
+        <p:cTn id="1" dur="indefinite" restart="never" nodeType="tmRoot"/>
+      </p:par>
+    </p:tnLst>
+  </p:timing>
 </p:sld>
 </file>
 
@@ -5256,7 +6505,7 @@
           <p:nvPr/>
         </p:nvPicPr>
         <p:blipFill>
-          <a:blip r:embed="rId2">
+          <a:blip r:embed="rId3">
             <a:extLst>
               <a:ext uri="{28A0092B-C50C-407E-A947-70E740481C1C}">
                 <a14:useLocalDpi xmlns:a14="http://schemas.microsoft.com/office/drawing/2010/main" val="0"/>
@@ -6737,6 +7986,13 @@
   <p:clrMapOvr>
     <a:masterClrMapping/>
   </p:clrMapOvr>
+  <p:timing>
+    <p:tnLst>
+      <p:par>
+        <p:cTn id="1" dur="indefinite" restart="never" nodeType="tmRoot"/>
+      </p:par>
+    </p:tnLst>
+  </p:timing>
 </p:sld>
 </file>
 
@@ -6766,7 +8022,7 @@
           <p:nvPr/>
         </p:nvPicPr>
         <p:blipFill>
-          <a:blip r:embed="rId2">
+          <a:blip r:embed="rId3">
             <a:extLst>
               <a:ext uri="{28A0092B-C50C-407E-A947-70E740481C1C}">
                 <a14:useLocalDpi xmlns:a14="http://schemas.microsoft.com/office/drawing/2010/main" val="0"/>
@@ -6883,23 +8139,7 @@
                   <a:schemeClr val="bg1"/>
                 </a:solidFill>
               </a:rPr>
-              <a:t> to </a:t>
-            </a:r>
-            <a:r>
-              <a:rPr lang="en-CA" dirty="0" smtClean="0">
-                <a:solidFill>
-                  <a:schemeClr val="bg1"/>
-                </a:solidFill>
-              </a:rPr>
-              <a:t>the task </a:t>
-            </a:r>
-            <a:r>
-              <a:rPr lang="en-CA" dirty="0" smtClean="0">
-                <a:solidFill>
-                  <a:schemeClr val="bg1"/>
-                </a:solidFill>
-              </a:rPr>
-              <a:t>body and check in your body for cancellation where it makes sense</a:t>
+              <a:t> to the task body and check in your body for cancellation where it makes sense</a:t>
             </a:r>
           </a:p>
           <a:p>
@@ -7289,17 +8529,7 @@
                 <a:latin typeface="Consolas" panose="020B0609020204030204" pitchFamily="49" charset="0"/>
                 <a:cs typeface="Consolas" panose="020B0609020204030204" pitchFamily="49" charset="0"/>
               </a:rPr>
-              <a:t>) </a:t>
-            </a:r>
-            <a:r>
-              <a:rPr lang="en-US" altLang="en-US" sz="1400" dirty="0" smtClean="0">
-                <a:solidFill>
-                  <a:srgbClr val="000000"/>
-                </a:solidFill>
-                <a:latin typeface="Consolas" panose="020B0609020204030204" pitchFamily="49" charset="0"/>
-                <a:cs typeface="Consolas" panose="020B0609020204030204" pitchFamily="49" charset="0"/>
-              </a:rPr>
-              <a:t>{</a:t>
+              <a:t>) {</a:t>
             </a:r>
           </a:p>
           <a:p>
@@ -7503,21 +8733,7 @@
                 <a:latin typeface="Consolas" panose="020B0609020204030204" pitchFamily="49" charset="0"/>
                 <a:cs typeface="Consolas" panose="020B0609020204030204" pitchFamily="49" charset="0"/>
               </a:rPr>
-              <a:t>    </a:t>
-            </a:r>
-            <a:r>
-              <a:rPr kumimoji="0" lang="en-US" altLang="en-US" sz="1400" b="0" i="0" u="none" strike="noStrike" cap="none" normalizeH="0" baseline="0" dirty="0" smtClean="0">
-                <a:ln>
-                  <a:noFill/>
-                </a:ln>
-                <a:solidFill>
-                  <a:srgbClr val="000000"/>
-                </a:solidFill>
-                <a:effectLst/>
-                <a:latin typeface="Consolas" panose="020B0609020204030204" pitchFamily="49" charset="0"/>
-                <a:cs typeface="Consolas" panose="020B0609020204030204" pitchFamily="49" charset="0"/>
-              </a:rPr>
-              <a:t>}</a:t>
+              <a:t>    }</a:t>
             </a:r>
           </a:p>
           <a:p>
@@ -7584,21 +8800,7 @@
                 <a:latin typeface="Consolas" panose="020B0609020204030204" pitchFamily="49" charset="0"/>
                 <a:cs typeface="Consolas" panose="020B0609020204030204" pitchFamily="49" charset="0"/>
               </a:rPr>
-              <a:t>//</a:t>
-            </a:r>
-            <a:r>
-              <a:rPr kumimoji="0" lang="en-US" altLang="en-US" sz="1400" b="0" i="0" u="none" strike="noStrike" cap="none" normalizeH="0" baseline="0" dirty="0" smtClean="0">
-                <a:ln>
-                  <a:noFill/>
-                </a:ln>
-                <a:solidFill>
-                  <a:srgbClr val="008000"/>
-                </a:solidFill>
-                <a:effectLst/>
-                <a:latin typeface="Consolas" panose="020B0609020204030204" pitchFamily="49" charset="0"/>
-                <a:cs typeface="Consolas" panose="020B0609020204030204" pitchFamily="49" charset="0"/>
-              </a:rPr>
-              <a:t> Do work here.</a:t>
+              <a:t>// Do work here.</a:t>
             </a:r>
           </a:p>
           <a:p>
@@ -7630,35 +8832,7 @@
                 <a:latin typeface="Consolas" panose="020B0609020204030204" pitchFamily="49" charset="0"/>
                 <a:cs typeface="Consolas" panose="020B0609020204030204" pitchFamily="49" charset="0"/>
               </a:rPr>
-              <a:t> </a:t>
-            </a:r>
-            <a:r>
-              <a:rPr kumimoji="0" lang="en-US" altLang="en-US" sz="1400" b="0" i="0" u="none" strike="noStrike" cap="none" normalizeH="0" baseline="0" dirty="0" smtClean="0">
-                <a:ln>
-                  <a:noFill/>
-                </a:ln>
-                <a:solidFill>
-                  <a:srgbClr val="000000"/>
-                </a:solidFill>
-                <a:effectLst/>
-                <a:latin typeface="Consolas" panose="020B0609020204030204" pitchFamily="49" charset="0"/>
-                <a:cs typeface="Consolas" panose="020B0609020204030204" pitchFamily="49" charset="0"/>
-              </a:rPr>
-              <a:t>},</a:t>
-            </a:r>
-            <a:r>
-              <a:rPr kumimoji="0" lang="en-US" altLang="en-US" sz="1400" b="0" i="0" u="none" strike="noStrike" cap="none" normalizeH="0" baseline="0" dirty="0" smtClean="0">
-                <a:ln>
-                  <a:noFill/>
-                </a:ln>
-                <a:solidFill>
-                  <a:srgbClr val="000000"/>
-                </a:solidFill>
-                <a:effectLst/>
-                <a:latin typeface="Consolas" panose="020B0609020204030204" pitchFamily="49" charset="0"/>
-                <a:cs typeface="Consolas" panose="020B0609020204030204" pitchFamily="49" charset="0"/>
-              </a:rPr>
-              <a:t> token); </a:t>
+              <a:t> }, token); </a:t>
             </a:r>
             <a:endParaRPr kumimoji="0" lang="en-US" altLang="en-US" sz="1400" b="0" i="0" u="none" strike="noStrike" cap="none" normalizeH="0" baseline="0" dirty="0" smtClean="0">
               <a:ln>
@@ -7719,7 +8893,7 @@
           <p:nvPr/>
         </p:nvPicPr>
         <p:blipFill>
-          <a:blip r:embed="rId2">
+          <a:blip r:embed="rId3">
             <a:extLst>
               <a:ext uri="{28A0092B-C50C-407E-A947-70E740481C1C}">
                 <a14:useLocalDpi xmlns:a14="http://schemas.microsoft.com/office/drawing/2010/main" val="0"/>
@@ -8621,7 +9795,7 @@
           <p:nvPr/>
         </p:nvPicPr>
         <p:blipFill>
-          <a:blip r:embed="rId2">
+          <a:blip r:embed="rId3">
             <a:extLst>
               <a:ext uri="{28A0092B-C50C-407E-A947-70E740481C1C}">
                 <a14:useLocalDpi xmlns:a14="http://schemas.microsoft.com/office/drawing/2010/main" val="0"/>
@@ -8716,7 +9890,7 @@
                 <a:solidFill>
                   <a:schemeClr val="bg1"/>
                 </a:solidFill>
-                <a:hlinkClick r:id="rId3"/>
+                <a:hlinkClick r:id="rId4"/>
               </a:rPr>
               <a:t>TPL on MSDN</a:t>
             </a:r>
@@ -8732,7 +9906,7 @@
                 <a:solidFill>
                   <a:schemeClr val="bg1"/>
                 </a:solidFill>
-                <a:hlinkClick r:id="rId4"/>
+                <a:hlinkClick r:id="rId5"/>
               </a:rPr>
               <a:t>5 Ways to Start a Task</a:t>
             </a:r>
@@ -8748,7 +9922,7 @@
                 <a:solidFill>
                   <a:schemeClr val="bg1"/>
                 </a:solidFill>
-                <a:hlinkClick r:id="rId5"/>
+                <a:hlinkClick r:id="rId6"/>
               </a:rPr>
               <a:t>MSDN: How to cancel a </a:t>
             </a:r>
@@ -8757,7 +9931,7 @@
                 <a:solidFill>
                   <a:schemeClr val="bg1"/>
                 </a:solidFill>
-                <a:hlinkClick r:id="rId5"/>
+                <a:hlinkClick r:id="rId6"/>
               </a:rPr>
               <a:t>Parallel.ForEach</a:t>
             </a:r>
@@ -8773,7 +9947,7 @@
                 <a:solidFill>
                   <a:schemeClr val="bg1"/>
                 </a:solidFill>
-                <a:hlinkClick r:id="rId6"/>
+                <a:hlinkClick r:id="rId7"/>
               </a:rPr>
               <a:t>MSDN: Common Pitfalls in Parallelization</a:t>
             </a:r>
@@ -8809,7 +9983,7 @@
                 <a:solidFill>
                   <a:schemeClr val="bg1"/>
                 </a:solidFill>
-                <a:hlinkClick r:id="rId7"/>
+                <a:hlinkClick r:id="rId8"/>
               </a:rPr>
               <a:t>PLINQ – Parallelized </a:t>
             </a:r>
@@ -8818,7 +9992,7 @@
                 <a:solidFill>
                   <a:schemeClr val="bg1"/>
                 </a:solidFill>
-                <a:hlinkClick r:id="rId7"/>
+                <a:hlinkClick r:id="rId8"/>
               </a:rPr>
               <a:t>Linq</a:t>
             </a:r>
@@ -8839,7 +10013,7 @@
                 <a:solidFill>
                   <a:schemeClr val="bg1"/>
                 </a:solidFill>
-                <a:hlinkClick r:id="rId8"/>
+                <a:hlinkClick r:id="rId9"/>
               </a:rPr>
               <a:t>Best Practices for Using </a:t>
             </a:r>
@@ -8848,7 +10022,7 @@
                 <a:solidFill>
                   <a:schemeClr val="bg1"/>
                 </a:solidFill>
-                <a:hlinkClick r:id="rId8"/>
+                <a:hlinkClick r:id="rId9"/>
               </a:rPr>
               <a:t>ConcurrentDictionary</a:t>
             </a:r>
@@ -8869,7 +10043,7 @@
                 <a:solidFill>
                   <a:schemeClr val="bg1"/>
                 </a:solidFill>
-                <a:hlinkClick r:id="rId9"/>
+                <a:hlinkClick r:id="rId10"/>
               </a:rPr>
               <a:t>Using Lazy Instead of Double-Check Locking</a:t>
             </a:r>
@@ -9136,15 +10310,7 @@
                   <a:schemeClr val="accent1"/>
                 </a:solidFill>
               </a:rPr>
-              <a:t> </a:t>
-            </a:r>
-            <a:r>
-              <a:rPr lang="en-CA" dirty="0" smtClean="0">
-                <a:solidFill>
-                  <a:schemeClr val="accent1"/>
-                </a:solidFill>
-              </a:rPr>
-              <a:t>Code &amp; Slides</a:t>
+              <a:t> Code &amp; Slides</a:t>
             </a:r>
             <a:endParaRPr lang="en-CA" dirty="0">
               <a:solidFill>
@@ -9326,7 +10492,7 @@
           <p:nvPr/>
         </p:nvPicPr>
         <p:blipFill>
-          <a:blip r:embed="rId2">
+          <a:blip r:embed="rId3">
             <a:extLst>
               <a:ext uri="{28A0092B-C50C-407E-A947-70E740481C1C}">
                 <a14:useLocalDpi xmlns:a14="http://schemas.microsoft.com/office/drawing/2010/main" val="0"/>
@@ -9405,7 +10571,7 @@
           </p:nvPr>
         </p:nvPicPr>
         <p:blipFill>
-          <a:blip r:embed="rId3">
+          <a:blip r:embed="rId4">
             <a:extLst>
               <a:ext uri="{28A0092B-C50C-407E-A947-70E740481C1C}">
                 <a14:useLocalDpi xmlns:a14="http://schemas.microsoft.com/office/drawing/2010/main" val="0"/>
@@ -10263,7 +11429,7 @@
           <p:nvPr/>
         </p:nvPicPr>
         <p:blipFill>
-          <a:blip r:embed="rId2">
+          <a:blip r:embed="rId3">
             <a:extLst>
               <a:ext uri="{28A0092B-C50C-407E-A947-70E740481C1C}">
                 <a14:useLocalDpi xmlns:a14="http://schemas.microsoft.com/office/drawing/2010/main" val="0"/>
@@ -10384,7 +11550,7 @@
                 <a:solidFill>
                   <a:schemeClr val="bg1"/>
                 </a:solidFill>
-                <a:hlinkClick r:id="rId3"/>
+                <a:hlinkClick r:id="rId4"/>
               </a:rPr>
               <a:t>System.Threading</a:t>
             </a:r>
@@ -10401,7 +11567,7 @@
                 <a:solidFill>
                   <a:schemeClr val="bg1"/>
                 </a:solidFill>
-                <a:hlinkClick r:id="rId4"/>
+                <a:hlinkClick r:id="rId5"/>
               </a:rPr>
               <a:t>System.Threading.Tasks</a:t>
             </a:r>
@@ -10536,7 +11702,7 @@
           <p:nvPr/>
         </p:nvPicPr>
         <p:blipFill>
-          <a:blip r:embed="rId2">
+          <a:blip r:embed="rId3">
             <a:extLst>
               <a:ext uri="{28A0092B-C50C-407E-A947-70E740481C1C}">
                 <a14:useLocalDpi xmlns:a14="http://schemas.microsoft.com/office/drawing/2010/main" val="0"/>
@@ -10752,7 +11918,7 @@
           <p:nvPr/>
         </p:nvPicPr>
         <p:blipFill>
-          <a:blip r:embed="rId2">
+          <a:blip r:embed="rId3">
             <a:extLst>
               <a:ext uri="{28A0092B-C50C-407E-A947-70E740481C1C}">
                 <a14:useLocalDpi xmlns:a14="http://schemas.microsoft.com/office/drawing/2010/main" val="0"/>
@@ -11856,7 +13022,7 @@
           <p:nvPr/>
         </p:nvPicPr>
         <p:blipFill>
-          <a:blip r:embed="rId2">
+          <a:blip r:embed="rId3">
             <a:extLst>
               <a:ext uri="{28A0092B-C50C-407E-A947-70E740481C1C}">
                 <a14:useLocalDpi xmlns:a14="http://schemas.microsoft.com/office/drawing/2010/main" val="0"/>
@@ -12159,7 +13325,7 @@
           <p:nvPr/>
         </p:nvPicPr>
         <p:blipFill>
-          <a:blip r:embed="rId2">
+          <a:blip r:embed="rId3">
             <a:extLst>
               <a:ext uri="{28A0092B-C50C-407E-A947-70E740481C1C}">
                 <a14:useLocalDpi xmlns:a14="http://schemas.microsoft.com/office/drawing/2010/main" val="0"/>
@@ -13288,7 +14454,7 @@
           <p:nvPr/>
         </p:nvPicPr>
         <p:blipFill>
-          <a:blip r:embed="rId2">
+          <a:blip r:embed="rId3">
             <a:extLst>
               <a:ext uri="{28A0092B-C50C-407E-A947-70E740481C1C}">
                 <a14:useLocalDpi xmlns:a14="http://schemas.microsoft.com/office/drawing/2010/main" val="0"/>
@@ -13376,7 +14542,7 @@
                 <a:solidFill>
                   <a:schemeClr val="bg1"/>
                 </a:solidFill>
-                <a:hlinkClick r:id="rId3"/>
+                <a:hlinkClick r:id="rId4"/>
               </a:rPr>
               <a:t>5 Ways To Start A Task In C#</a:t>
             </a:r>
@@ -14007,21 +15173,7 @@
                 <a:latin typeface="Consolas" panose="020B0609020204030204" pitchFamily="49" charset="0"/>
                 <a:cs typeface="Consolas" panose="020B0609020204030204" pitchFamily="49" charset="0"/>
               </a:rPr>
-              <a:t>( </a:t>
-            </a:r>
-            <a:r>
-              <a:rPr kumimoji="0" lang="en-US" altLang="en-US" sz="1400" b="0" i="0" u="none" strike="noStrike" cap="none" normalizeH="0" dirty="0" smtClean="0">
-                <a:ln>
-                  <a:noFill/>
-                </a:ln>
-                <a:solidFill>
-                  <a:srgbClr val="000000"/>
-                </a:solidFill>
-                <a:effectLst/>
-                <a:latin typeface="Consolas" panose="020B0609020204030204" pitchFamily="49" charset="0"/>
-                <a:cs typeface="Consolas" panose="020B0609020204030204" pitchFamily="49" charset="0"/>
-              </a:rPr>
-              <a:t>() =&gt; </a:t>
+              <a:t>( () =&gt; </a:t>
             </a:r>
             <a:r>
               <a:rPr kumimoji="0" lang="en-US" altLang="en-US" sz="1400" b="0" i="0" u="none" strike="noStrike" cap="none" normalizeH="0" dirty="0" err="1" smtClean="0">
@@ -14181,7 +15333,7 @@
           <p:nvPr/>
         </p:nvPicPr>
         <p:blipFill>
-          <a:blip r:embed="rId2">
+          <a:blip r:embed="rId3">
             <a:extLst>
               <a:ext uri="{28A0092B-C50C-407E-A947-70E740481C1C}">
                 <a14:useLocalDpi xmlns:a14="http://schemas.microsoft.com/office/drawing/2010/main" val="0"/>
@@ -15041,7 +16193,7 @@
           <p:nvPr/>
         </p:nvPicPr>
         <p:blipFill>
-          <a:blip r:embed="rId2">
+          <a:blip r:embed="rId3">
             <a:extLst>
               <a:ext uri="{28A0092B-C50C-407E-A947-70E740481C1C}">
                 <a14:useLocalDpi xmlns:a14="http://schemas.microsoft.com/office/drawing/2010/main" val="0"/>
@@ -15814,18 +16966,18 @@
 </file>
 
 <file path=customXml/item1.xml><?xml version="1.0" encoding="utf-8"?>
-<p:properties xmlns:p="http://schemas.microsoft.com/office/2006/metadata/properties" xmlns:xsi="http://www.w3.org/2001/XMLSchema-instance" xmlns:pc="http://schemas.microsoft.com/office/infopath/2007/PartnerControls">
-  <documentManagement/>
-</p:properties>
-</file>
-
-<file path=customXml/item2.xml><?xml version="1.0" encoding="utf-8"?>
 <?mso-contentType ?>
 <FormTemplates xmlns="http://schemas.microsoft.com/sharepoint/v3/contenttype/forms">
   <Display>DocumentLibraryForm</Display>
   <Edit>DocumentLibraryForm</Edit>
   <New>DocumentLibraryForm</New>
 </FormTemplates>
+</file>
+
+<file path=customXml/item2.xml><?xml version="1.0" encoding="utf-8"?>
+<p:properties xmlns:p="http://schemas.microsoft.com/office/2006/metadata/properties" xmlns:xsi="http://www.w3.org/2001/XMLSchema-instance" xmlns:pc="http://schemas.microsoft.com/office/infopath/2007/PartnerControls">
+  <documentManagement/>
+</p:properties>
 </file>
 
 <file path=customXml/item3.xml><?xml version="1.0" encoding="utf-8"?>
@@ -15969,25 +17121,25 @@
 </file>
 
 <file path=customXml/itemProps1.xml><?xml version="1.0" encoding="utf-8"?>
-<ds:datastoreItem xmlns:ds="http://schemas.openxmlformats.org/officeDocument/2006/customXml" ds:itemID="{4FFB1013-CD0D-4873-B58E-73637A5AF8BB}">
+<ds:datastoreItem xmlns:ds="http://schemas.openxmlformats.org/officeDocument/2006/customXml" ds:itemID="{0BE2A19F-D42B-4500-AFD2-91541784C114}">
   <ds:schemaRefs>
-    <ds:schemaRef ds:uri="http://schemas.microsoft.com/office/infopath/2007/PartnerControls"/>
-    <ds:schemaRef ds:uri="http://schemas.microsoft.com/office/2006/metadata/properties"/>
-    <ds:schemaRef ds:uri="http://schemas.microsoft.com/office/2006/documentManagement/types"/>
-    <ds:schemaRef ds:uri="http://purl.org/dc/terms/"/>
-    <ds:schemaRef ds:uri="http://www.w3.org/XML/1998/namespace"/>
-    <ds:schemaRef ds:uri="http://purl.org/dc/elements/1.1/"/>
-    <ds:schemaRef ds:uri="http://schemas.openxmlformats.org/package/2006/metadata/core-properties"/>
-    <ds:schemaRef ds:uri="a2ed09e4-0995-4688-857a-5521cd1b456b"/>
-    <ds:schemaRef ds:uri="http://purl.org/dc/dcmitype/"/>
+    <ds:schemaRef ds:uri="http://schemas.microsoft.com/sharepoint/v3/contenttype/forms"/>
   </ds:schemaRefs>
 </ds:datastoreItem>
 </file>
 
 <file path=customXml/itemProps2.xml><?xml version="1.0" encoding="utf-8"?>
-<ds:datastoreItem xmlns:ds="http://schemas.openxmlformats.org/officeDocument/2006/customXml" ds:itemID="{0BE2A19F-D42B-4500-AFD2-91541784C114}">
+<ds:datastoreItem xmlns:ds="http://schemas.openxmlformats.org/officeDocument/2006/customXml" ds:itemID="{4FFB1013-CD0D-4873-B58E-73637A5AF8BB}">
   <ds:schemaRefs>
-    <ds:schemaRef ds:uri="http://schemas.microsoft.com/sharepoint/v3/contenttype/forms"/>
+    <ds:schemaRef ds:uri="http://purl.org/dc/elements/1.1/"/>
+    <ds:schemaRef ds:uri="http://schemas.microsoft.com/office/2006/metadata/properties"/>
+    <ds:schemaRef ds:uri="a2ed09e4-0995-4688-857a-5521cd1b456b"/>
+    <ds:schemaRef ds:uri="http://www.w3.org/XML/1998/namespace"/>
+    <ds:schemaRef ds:uri="http://schemas.microsoft.com/office/2006/documentManagement/types"/>
+    <ds:schemaRef ds:uri="http://schemas.openxmlformats.org/package/2006/metadata/core-properties"/>
+    <ds:schemaRef ds:uri="http://purl.org/dc/terms/"/>
+    <ds:schemaRef ds:uri="http://schemas.microsoft.com/office/infopath/2007/PartnerControls"/>
+    <ds:schemaRef ds:uri="http://purl.org/dc/dcmitype/"/>
   </ds:schemaRefs>
 </ds:datastoreItem>
 </file>

</xml_diff>